<commit_message>
finalizing figure for eps publication
</commit_message>
<xml_diff>
--- a/figures/Figure1/figure1_finalforpdf.pptx
+++ b/figures/Figure1/figure1_finalforpdf.pptx
@@ -107,6 +107,11 @@
       </a:defRPr>
     </a:lvl9pPr>
   </p:defaultTextStyle>
+  <p:extLst>
+    <p:ext uri="{EFAFB233-063F-42B5-8137-9DF3F51BA10A}">
+      <p15:sldGuideLst xmlns:p15="http://schemas.microsoft.com/office/powerpoint/2012/main"/>
+    </p:ext>
+  </p:extLst>
 </p:presentation>
 </file>
 
@@ -192,7 +197,7 @@
           <a:p>
             <a:fld id="{61A7976E-9F0E-DF46-BEE6-B263DADB2CCE}" type="datetimeFigureOut">
               <a:rPr lang="en-US" smtClean="0"/>
-              <a:t>9/7/21</a:t>
+              <a:t>9/12/21</a:t>
             </a:fld>
             <a:endParaRPr lang="en-US"/>
           </a:p>
@@ -869,7 +874,7 @@
           <a:p>
             <a:fld id="{5858EA79-B7C1-E245-85A8-5D7A58E35F5C}" type="datetimeFigureOut">
               <a:rPr lang="en-US" smtClean="0"/>
-              <a:t>9/7/21</a:t>
+              <a:t>9/12/21</a:t>
             </a:fld>
             <a:endParaRPr lang="en-US"/>
           </a:p>
@@ -1039,7 +1044,7 @@
           <a:p>
             <a:fld id="{5858EA79-B7C1-E245-85A8-5D7A58E35F5C}" type="datetimeFigureOut">
               <a:rPr lang="en-US" smtClean="0"/>
-              <a:t>9/7/21</a:t>
+              <a:t>9/12/21</a:t>
             </a:fld>
             <a:endParaRPr lang="en-US"/>
           </a:p>
@@ -1219,7 +1224,7 @@
           <a:p>
             <a:fld id="{5858EA79-B7C1-E245-85A8-5D7A58E35F5C}" type="datetimeFigureOut">
               <a:rPr lang="en-US" smtClean="0"/>
-              <a:t>9/7/21</a:t>
+              <a:t>9/12/21</a:t>
             </a:fld>
             <a:endParaRPr lang="en-US"/>
           </a:p>
@@ -1389,7 +1394,7 @@
           <a:p>
             <a:fld id="{5858EA79-B7C1-E245-85A8-5D7A58E35F5C}" type="datetimeFigureOut">
               <a:rPr lang="en-US" smtClean="0"/>
-              <a:t>9/7/21</a:t>
+              <a:t>9/12/21</a:t>
             </a:fld>
             <a:endParaRPr lang="en-US"/>
           </a:p>
@@ -1633,7 +1638,7 @@
           <a:p>
             <a:fld id="{5858EA79-B7C1-E245-85A8-5D7A58E35F5C}" type="datetimeFigureOut">
               <a:rPr lang="en-US" smtClean="0"/>
-              <a:t>9/7/21</a:t>
+              <a:t>9/12/21</a:t>
             </a:fld>
             <a:endParaRPr lang="en-US"/>
           </a:p>
@@ -1865,7 +1870,7 @@
           <a:p>
             <a:fld id="{5858EA79-B7C1-E245-85A8-5D7A58E35F5C}" type="datetimeFigureOut">
               <a:rPr lang="en-US" smtClean="0"/>
-              <a:t>9/7/21</a:t>
+              <a:t>9/12/21</a:t>
             </a:fld>
             <a:endParaRPr lang="en-US"/>
           </a:p>
@@ -2232,7 +2237,7 @@
           <a:p>
             <a:fld id="{5858EA79-B7C1-E245-85A8-5D7A58E35F5C}" type="datetimeFigureOut">
               <a:rPr lang="en-US" smtClean="0"/>
-              <a:t>9/7/21</a:t>
+              <a:t>9/12/21</a:t>
             </a:fld>
             <a:endParaRPr lang="en-US"/>
           </a:p>
@@ -2350,7 +2355,7 @@
           <a:p>
             <a:fld id="{5858EA79-B7C1-E245-85A8-5D7A58E35F5C}" type="datetimeFigureOut">
               <a:rPr lang="en-US" smtClean="0"/>
-              <a:t>9/7/21</a:t>
+              <a:t>9/12/21</a:t>
             </a:fld>
             <a:endParaRPr lang="en-US"/>
           </a:p>
@@ -2445,7 +2450,7 @@
           <a:p>
             <a:fld id="{5858EA79-B7C1-E245-85A8-5D7A58E35F5C}" type="datetimeFigureOut">
               <a:rPr lang="en-US" smtClean="0"/>
-              <a:t>9/7/21</a:t>
+              <a:t>9/12/21</a:t>
             </a:fld>
             <a:endParaRPr lang="en-US"/>
           </a:p>
@@ -2722,7 +2727,7 @@
           <a:p>
             <a:fld id="{5858EA79-B7C1-E245-85A8-5D7A58E35F5C}" type="datetimeFigureOut">
               <a:rPr lang="en-US" smtClean="0"/>
-              <a:t>9/7/21</a:t>
+              <a:t>9/12/21</a:t>
             </a:fld>
             <a:endParaRPr lang="en-US"/>
           </a:p>
@@ -2979,7 +2984,7 @@
           <a:p>
             <a:fld id="{5858EA79-B7C1-E245-85A8-5D7A58E35F5C}" type="datetimeFigureOut">
               <a:rPr lang="en-US" smtClean="0"/>
-              <a:t>9/7/21</a:t>
+              <a:t>9/12/21</a:t>
             </a:fld>
             <a:endParaRPr lang="en-US"/>
           </a:p>
@@ -3192,7 +3197,7 @@
           <a:p>
             <a:fld id="{5858EA79-B7C1-E245-85A8-5D7A58E35F5C}" type="datetimeFigureOut">
               <a:rPr lang="en-US" smtClean="0"/>
-              <a:t>9/7/21</a:t>
+              <a:t>9/12/21</a:t>
             </a:fld>
             <a:endParaRPr lang="en-US"/>
           </a:p>
@@ -13725,6 +13730,61 @@
           </a:p>
         </p:txBody>
       </p:sp>
+      <p:sp>
+        <p:nvSpPr>
+          <p:cNvPr id="178" name="Arc 177">
+            <a:extLst>
+              <a:ext uri="{FF2B5EF4-FFF2-40B4-BE49-F238E27FC236}">
+                <a16:creationId xmlns:a16="http://schemas.microsoft.com/office/drawing/2014/main" id="{3729CA7E-E345-9345-8EB4-2C2F1B9D8C24}"/>
+              </a:ext>
+            </a:extLst>
+          </p:cNvPr>
+          <p:cNvSpPr/>
+          <p:nvPr/>
+        </p:nvSpPr>
+        <p:spPr>
+          <a:xfrm rot="16200000" flipH="1" flipV="1">
+            <a:off x="3019941" y="-1612263"/>
+            <a:ext cx="1691455" cy="3799836"/>
+          </a:xfrm>
+          <a:prstGeom prst="arc">
+            <a:avLst>
+              <a:gd name="adj1" fmla="val 16274761"/>
+              <a:gd name="adj2" fmla="val 21505580"/>
+            </a:avLst>
+          </a:prstGeom>
+          <a:ln w="12700">
+            <a:solidFill>
+              <a:schemeClr val="tx1">
+                <a:lumMod val="65000"/>
+                <a:lumOff val="35000"/>
+              </a:schemeClr>
+            </a:solidFill>
+          </a:ln>
+        </p:spPr>
+        <p:style>
+          <a:lnRef idx="1">
+            <a:schemeClr val="accent1"/>
+          </a:lnRef>
+          <a:fillRef idx="0">
+            <a:schemeClr val="accent1"/>
+          </a:fillRef>
+          <a:effectRef idx="0">
+            <a:schemeClr val="accent1"/>
+          </a:effectRef>
+          <a:fontRef idx="minor">
+            <a:schemeClr val="tx1"/>
+          </a:fontRef>
+        </p:style>
+        <p:txBody>
+          <a:bodyPr rtlCol="0" anchor="ctr"/>
+          <a:lstStyle/>
+          <a:p>
+            <a:pPr algn="ctr"/>
+            <a:endParaRPr lang="en-US"/>
+          </a:p>
+        </p:txBody>
+      </p:sp>
     </p:spTree>
     <p:extLst>
       <p:ext uri="{BB962C8B-B14F-4D97-AF65-F5344CB8AC3E}">

</xml_diff>

<commit_message>
added figure for number of tows per year and region
</commit_message>
<xml_diff>
--- a/figures/Figure1/figure1_finalforpdf.pptx
+++ b/figures/Figure1/figure1_finalforpdf.pptx
@@ -197,7 +197,7 @@
           <a:p>
             <a:fld id="{61A7976E-9F0E-DF46-BEE6-B263DADB2CCE}" type="datetimeFigureOut">
               <a:rPr lang="en-US" smtClean="0"/>
-              <a:t>9/12/21</a:t>
+              <a:t>10/27/21</a:t>
             </a:fld>
             <a:endParaRPr lang="en-US"/>
           </a:p>
@@ -624,7 +624,7 @@
                 <a:ea typeface="+mn-ea"/>
                 <a:cs typeface="+mn-cs"/>
               </a:rPr>
-              <a:t> and subsequent departure of higher-latitude species </a:t>
+              <a:t> and subsequent extirpation of higher-latitude species </a:t>
             </a:r>
             <a:r>
               <a:rPr lang="en-US" sz="1200" b="0" i="0" u="none" strike="noStrike" kern="1200" dirty="0">
@@ -874,7 +874,7 @@
           <a:p>
             <a:fld id="{5858EA79-B7C1-E245-85A8-5D7A58E35F5C}" type="datetimeFigureOut">
               <a:rPr lang="en-US" smtClean="0"/>
-              <a:t>9/12/21</a:t>
+              <a:t>10/27/21</a:t>
             </a:fld>
             <a:endParaRPr lang="en-US"/>
           </a:p>
@@ -1044,7 +1044,7 @@
           <a:p>
             <a:fld id="{5858EA79-B7C1-E245-85A8-5D7A58E35F5C}" type="datetimeFigureOut">
               <a:rPr lang="en-US" smtClean="0"/>
-              <a:t>9/12/21</a:t>
+              <a:t>10/27/21</a:t>
             </a:fld>
             <a:endParaRPr lang="en-US"/>
           </a:p>
@@ -1224,7 +1224,7 @@
           <a:p>
             <a:fld id="{5858EA79-B7C1-E245-85A8-5D7A58E35F5C}" type="datetimeFigureOut">
               <a:rPr lang="en-US" smtClean="0"/>
-              <a:t>9/12/21</a:t>
+              <a:t>10/27/21</a:t>
             </a:fld>
             <a:endParaRPr lang="en-US"/>
           </a:p>
@@ -1394,7 +1394,7 @@
           <a:p>
             <a:fld id="{5858EA79-B7C1-E245-85A8-5D7A58E35F5C}" type="datetimeFigureOut">
               <a:rPr lang="en-US" smtClean="0"/>
-              <a:t>9/12/21</a:t>
+              <a:t>10/27/21</a:t>
             </a:fld>
             <a:endParaRPr lang="en-US"/>
           </a:p>
@@ -1638,7 +1638,7 @@
           <a:p>
             <a:fld id="{5858EA79-B7C1-E245-85A8-5D7A58E35F5C}" type="datetimeFigureOut">
               <a:rPr lang="en-US" smtClean="0"/>
-              <a:t>9/12/21</a:t>
+              <a:t>10/27/21</a:t>
             </a:fld>
             <a:endParaRPr lang="en-US"/>
           </a:p>
@@ -1870,7 +1870,7 @@
           <a:p>
             <a:fld id="{5858EA79-B7C1-E245-85A8-5D7A58E35F5C}" type="datetimeFigureOut">
               <a:rPr lang="en-US" smtClean="0"/>
-              <a:t>9/12/21</a:t>
+              <a:t>10/27/21</a:t>
             </a:fld>
             <a:endParaRPr lang="en-US"/>
           </a:p>
@@ -2237,7 +2237,7 @@
           <a:p>
             <a:fld id="{5858EA79-B7C1-E245-85A8-5D7A58E35F5C}" type="datetimeFigureOut">
               <a:rPr lang="en-US" smtClean="0"/>
-              <a:t>9/12/21</a:t>
+              <a:t>10/27/21</a:t>
             </a:fld>
             <a:endParaRPr lang="en-US"/>
           </a:p>
@@ -2355,7 +2355,7 @@
           <a:p>
             <a:fld id="{5858EA79-B7C1-E245-85A8-5D7A58E35F5C}" type="datetimeFigureOut">
               <a:rPr lang="en-US" smtClean="0"/>
-              <a:t>9/12/21</a:t>
+              <a:t>10/27/21</a:t>
             </a:fld>
             <a:endParaRPr lang="en-US"/>
           </a:p>
@@ -2450,7 +2450,7 @@
           <a:p>
             <a:fld id="{5858EA79-B7C1-E245-85A8-5D7A58E35F5C}" type="datetimeFigureOut">
               <a:rPr lang="en-US" smtClean="0"/>
-              <a:t>9/12/21</a:t>
+              <a:t>10/27/21</a:t>
             </a:fld>
             <a:endParaRPr lang="en-US"/>
           </a:p>
@@ -2727,7 +2727,7 @@
           <a:p>
             <a:fld id="{5858EA79-B7C1-E245-85A8-5D7A58E35F5C}" type="datetimeFigureOut">
               <a:rPr lang="en-US" smtClean="0"/>
-              <a:t>9/12/21</a:t>
+              <a:t>10/27/21</a:t>
             </a:fld>
             <a:endParaRPr lang="en-US"/>
           </a:p>
@@ -2984,7 +2984,7 @@
           <a:p>
             <a:fld id="{5858EA79-B7C1-E245-85A8-5D7A58E35F5C}" type="datetimeFigureOut">
               <a:rPr lang="en-US" smtClean="0"/>
-              <a:t>9/12/21</a:t>
+              <a:t>10/27/21</a:t>
             </a:fld>
             <a:endParaRPr lang="en-US"/>
           </a:p>
@@ -3197,7 +3197,7 @@
           <a:p>
             <a:fld id="{5858EA79-B7C1-E245-85A8-5D7A58E35F5C}" type="datetimeFigureOut">
               <a:rPr lang="en-US" smtClean="0"/>
-              <a:t>9/12/21</a:t>
+              <a:t>10/27/21</a:t>
             </a:fld>
             <a:endParaRPr lang="en-US"/>
           </a:p>
@@ -6241,7 +6241,7 @@
                 <a:latin typeface="Helvetica" pitchFamily="2" charset="0"/>
                 <a:sym typeface="Wingdings" pitchFamily="2" charset="2"/>
               </a:rPr>
-              <a:t> Arrivals of warm-water species in temperate regions</a:t>
+              <a:t> Gains of warm-water species in temperate regions</a:t>
             </a:r>
           </a:p>
         </p:txBody>
@@ -8590,7 +8590,7 @@
                 <a:latin typeface="Helvetica" pitchFamily="2" charset="0"/>
                 <a:sym typeface="Wingdings" pitchFamily="2" charset="2"/>
               </a:rPr>
-              <a:t>More arrivals,</a:t>
+              <a:t>More gains,</a:t>
             </a:r>
           </a:p>
           <a:p>
@@ -8599,7 +8599,7 @@
                 <a:latin typeface="Helvetica" pitchFamily="2" charset="0"/>
                 <a:sym typeface="Wingdings" pitchFamily="2" charset="2"/>
               </a:rPr>
-              <a:t>Fewer departures</a:t>
+              <a:t>Fewer losses</a:t>
             </a:r>
             <a:endParaRPr lang="en-US" sz="700" dirty="0">
               <a:latin typeface="Helvetica" pitchFamily="2" charset="0"/>
@@ -8655,7 +8655,7 @@
                 <a:latin typeface="Helvetica" pitchFamily="2" charset="0"/>
                 <a:sym typeface="Wingdings" pitchFamily="2" charset="2"/>
               </a:rPr>
-              <a:t>Fewer arrivals,</a:t>
+              <a:t>Fewer gains,</a:t>
             </a:r>
           </a:p>
           <a:p>
@@ -8664,7 +8664,7 @@
                 <a:latin typeface="Helvetica" pitchFamily="2" charset="0"/>
                 <a:sym typeface="Wingdings" pitchFamily="2" charset="2"/>
               </a:rPr>
-              <a:t>More departures</a:t>
+              <a:t>More losses</a:t>
             </a:r>
             <a:endParaRPr lang="en-US" sz="700" dirty="0">
               <a:latin typeface="Helvetica" pitchFamily="2" charset="0"/>
@@ -9369,7 +9369,7 @@
                 <a:latin typeface="Helvetica" pitchFamily="2" charset="0"/>
                 <a:sym typeface="Wingdings" pitchFamily="2" charset="2"/>
               </a:rPr>
-              <a:t>Cooling  Departures of cold-water species from temperate regions</a:t>
+              <a:t>Cooling  Losses of cold-water species from temperate regions</a:t>
             </a:r>
           </a:p>
         </p:txBody>
@@ -9720,7 +9720,7 @@
               <a:rPr lang="en-US" sz="619" dirty="0">
                 <a:latin typeface="Helvetica" pitchFamily="2" charset="0"/>
               </a:rPr>
-              <a:t>Arrivals</a:t>
+              <a:t>Gains</a:t>
             </a:r>
           </a:p>
         </p:txBody>
@@ -9758,7 +9758,7 @@
               <a:rPr lang="en-US" sz="619" dirty="0">
                 <a:latin typeface="Helvetica" pitchFamily="2" charset="0"/>
               </a:rPr>
-              <a:t>Departures</a:t>
+              <a:t>Losses</a:t>
             </a:r>
           </a:p>
         </p:txBody>
@@ -10040,7 +10040,7 @@
               <a:rPr lang="en-US" sz="700" dirty="0">
                 <a:latin typeface="Helvetica" pitchFamily="2" charset="0"/>
               </a:rPr>
-              <a:t>More arrivals and departures in years of large changes in temperature</a:t>
+              <a:t>More gains and losses in years of large changes in temperature</a:t>
             </a:r>
           </a:p>
         </p:txBody>
@@ -10350,7 +10350,7 @@
               <a:rPr lang="en-US" sz="700" dirty="0">
                 <a:latin typeface="Helvetica" pitchFamily="2" charset="0"/>
               </a:rPr>
-              <a:t>Fewer arrivals, </a:t>
+              <a:t>Fewer gains, </a:t>
             </a:r>
           </a:p>
           <a:p>
@@ -10358,7 +10358,7 @@
               <a:rPr lang="en-US" sz="700" dirty="0">
                 <a:latin typeface="Helvetica" pitchFamily="2" charset="0"/>
               </a:rPr>
-              <a:t>Fewer departures</a:t>
+              <a:t>Fewer losses</a:t>
             </a:r>
           </a:p>
         </p:txBody>
@@ -10403,7 +10403,7 @@
               <a:rPr lang="en-US" sz="700" dirty="0">
                 <a:latin typeface="Helvetica" pitchFamily="2" charset="0"/>
               </a:rPr>
-              <a:t>More arrivals, </a:t>
+              <a:t>More gains, </a:t>
             </a:r>
           </a:p>
           <a:p>
@@ -10411,7 +10411,7 @@
               <a:rPr lang="en-US" sz="700" dirty="0">
                 <a:latin typeface="Helvetica" pitchFamily="2" charset="0"/>
               </a:rPr>
-              <a:t>More departures</a:t>
+              <a:t>More losses</a:t>
             </a:r>
           </a:p>
         </p:txBody>
@@ -13542,7 +13542,7 @@
           <a:p>
             <a:r>
               <a:rPr lang="en-US" sz="700" dirty="0"/>
-              <a:t>Departures</a:t>
+              <a:t>Losses</a:t>
             </a:r>
           </a:p>
         </p:txBody>
@@ -13577,7 +13577,7 @@
           <a:p>
             <a:r>
               <a:rPr lang="en-US" sz="700" dirty="0"/>
-              <a:t>Arrivals</a:t>
+              <a:t>Gains</a:t>
             </a:r>
           </a:p>
         </p:txBody>

</xml_diff>

<commit_message>
updated figure 3 for revision with more random effects in models
</commit_message>
<xml_diff>
--- a/figures/Figure1/figure1_finalforpdf.pptx
+++ b/figures/Figure1/figure1_finalforpdf.pptx
@@ -1979,7 +1979,7 @@
           <a:p>
             <a:fld id="{61A7976E-9F0E-DF46-BEE6-B263DADB2CCE}" type="datetimeFigureOut">
               <a:rPr lang="en-US" smtClean="0"/>
-              <a:t>11/4/21</a:t>
+              <a:t>8/26/22</a:t>
             </a:fld>
             <a:endParaRPr lang="en-US"/>
           </a:p>
@@ -2656,7 +2656,7 @@
           <a:p>
             <a:fld id="{5858EA79-B7C1-E245-85A8-5D7A58E35F5C}" type="datetimeFigureOut">
               <a:rPr lang="en-US" smtClean="0"/>
-              <a:t>11/4/21</a:t>
+              <a:t>8/26/22</a:t>
             </a:fld>
             <a:endParaRPr lang="en-US"/>
           </a:p>
@@ -2826,7 +2826,7 @@
           <a:p>
             <a:fld id="{5858EA79-B7C1-E245-85A8-5D7A58E35F5C}" type="datetimeFigureOut">
               <a:rPr lang="en-US" smtClean="0"/>
-              <a:t>11/4/21</a:t>
+              <a:t>8/26/22</a:t>
             </a:fld>
             <a:endParaRPr lang="en-US"/>
           </a:p>
@@ -3006,7 +3006,7 @@
           <a:p>
             <a:fld id="{5858EA79-B7C1-E245-85A8-5D7A58E35F5C}" type="datetimeFigureOut">
               <a:rPr lang="en-US" smtClean="0"/>
-              <a:t>11/4/21</a:t>
+              <a:t>8/26/22</a:t>
             </a:fld>
             <a:endParaRPr lang="en-US"/>
           </a:p>
@@ -3176,7 +3176,7 @@
           <a:p>
             <a:fld id="{5858EA79-B7C1-E245-85A8-5D7A58E35F5C}" type="datetimeFigureOut">
               <a:rPr lang="en-US" smtClean="0"/>
-              <a:t>11/4/21</a:t>
+              <a:t>8/26/22</a:t>
             </a:fld>
             <a:endParaRPr lang="en-US"/>
           </a:p>
@@ -3420,7 +3420,7 @@
           <a:p>
             <a:fld id="{5858EA79-B7C1-E245-85A8-5D7A58E35F5C}" type="datetimeFigureOut">
               <a:rPr lang="en-US" smtClean="0"/>
-              <a:t>11/4/21</a:t>
+              <a:t>8/26/22</a:t>
             </a:fld>
             <a:endParaRPr lang="en-US"/>
           </a:p>
@@ -3652,7 +3652,7 @@
           <a:p>
             <a:fld id="{5858EA79-B7C1-E245-85A8-5D7A58E35F5C}" type="datetimeFigureOut">
               <a:rPr lang="en-US" smtClean="0"/>
-              <a:t>11/4/21</a:t>
+              <a:t>8/26/22</a:t>
             </a:fld>
             <a:endParaRPr lang="en-US"/>
           </a:p>
@@ -4019,7 +4019,7 @@
           <a:p>
             <a:fld id="{5858EA79-B7C1-E245-85A8-5D7A58E35F5C}" type="datetimeFigureOut">
               <a:rPr lang="en-US" smtClean="0"/>
-              <a:t>11/4/21</a:t>
+              <a:t>8/26/22</a:t>
             </a:fld>
             <a:endParaRPr lang="en-US"/>
           </a:p>
@@ -4137,7 +4137,7 @@
           <a:p>
             <a:fld id="{5858EA79-B7C1-E245-85A8-5D7A58E35F5C}" type="datetimeFigureOut">
               <a:rPr lang="en-US" smtClean="0"/>
-              <a:t>11/4/21</a:t>
+              <a:t>8/26/22</a:t>
             </a:fld>
             <a:endParaRPr lang="en-US"/>
           </a:p>
@@ -4232,7 +4232,7 @@
           <a:p>
             <a:fld id="{5858EA79-B7C1-E245-85A8-5D7A58E35F5C}" type="datetimeFigureOut">
               <a:rPr lang="en-US" smtClean="0"/>
-              <a:t>11/4/21</a:t>
+              <a:t>8/26/22</a:t>
             </a:fld>
             <a:endParaRPr lang="en-US"/>
           </a:p>
@@ -4509,7 +4509,7 @@
           <a:p>
             <a:fld id="{5858EA79-B7C1-E245-85A8-5D7A58E35F5C}" type="datetimeFigureOut">
               <a:rPr lang="en-US" smtClean="0"/>
-              <a:t>11/4/21</a:t>
+              <a:t>8/26/22</a:t>
             </a:fld>
             <a:endParaRPr lang="en-US"/>
           </a:p>
@@ -4766,7 +4766,7 @@
           <a:p>
             <a:fld id="{5858EA79-B7C1-E245-85A8-5D7A58E35F5C}" type="datetimeFigureOut">
               <a:rPr lang="en-US" smtClean="0"/>
-              <a:t>11/4/21</a:t>
+              <a:t>8/26/22</a:t>
             </a:fld>
             <a:endParaRPr lang="en-US"/>
           </a:p>
@@ -4979,7 +4979,7 @@
           <a:p>
             <a:fld id="{5858EA79-B7C1-E245-85A8-5D7A58E35F5C}" type="datetimeFigureOut">
               <a:rPr lang="en-US" smtClean="0"/>
-              <a:t>11/4/21</a:t>
+              <a:t>8/26/22</a:t>
             </a:fld>
             <a:endParaRPr lang="en-US"/>
           </a:p>
@@ -12013,8 +12013,8 @@
         </p:nvSpPr>
         <p:spPr>
           <a:xfrm>
-            <a:off x="3727387" y="710041"/>
-            <a:ext cx="1202988" cy="415498"/>
+            <a:off x="3727386" y="647286"/>
+            <a:ext cx="1736731" cy="523220"/>
           </a:xfrm>
           <a:prstGeom prst="rect">
             <a:avLst/>
@@ -12031,15 +12031,19 @@
               <a:rPr lang="en-US" sz="700" dirty="0">
                 <a:latin typeface="Helvetica" pitchFamily="2" charset="0"/>
               </a:rPr>
-              <a:t>Lower movement,</a:t>
+              <a:t>Larger population sizes,</a:t>
             </a:r>
+          </a:p>
+          <a:p>
             <a:r>
               <a:rPr lang="en-US" sz="700" dirty="0">
                 <a:latin typeface="Helvetica" pitchFamily="2" charset="0"/>
                 <a:sym typeface="Wingdings" pitchFamily="2" charset="2"/>
               </a:rPr>
-              <a:t>                       </a:t>
+              <a:t>Slower population dynamics,</a:t>
             </a:r>
+          </a:p>
+          <a:p>
             <a:r>
               <a:rPr lang="en-US" sz="700" dirty="0">
                 <a:latin typeface="Helvetica" pitchFamily="2" charset="0"/>
@@ -12071,8 +12075,8 @@
         </p:nvSpPr>
         <p:spPr>
           <a:xfrm>
-            <a:off x="4789458" y="135298"/>
-            <a:ext cx="1161484" cy="415498"/>
+            <a:off x="4624098" y="18753"/>
+            <a:ext cx="1434423" cy="523220"/>
           </a:xfrm>
           <a:prstGeom prst="rect">
             <a:avLst/>
@@ -12089,7 +12093,15 @@
               <a:rPr lang="en-US" sz="700" dirty="0">
                 <a:latin typeface="Helvetica" pitchFamily="2" charset="0"/>
               </a:rPr>
-              <a:t>Higher movement,</a:t>
+              <a:t>Smaller population sizes,</a:t>
+            </a:r>
+          </a:p>
+          <a:p>
+            <a:r>
+              <a:rPr lang="en-US" sz="700" dirty="0">
+                <a:latin typeface="Helvetica" pitchFamily="2" charset="0"/>
+              </a:rPr>
+              <a:t>Faster population dynamics,</a:t>
             </a:r>
           </a:p>
           <a:p>
@@ -15587,8 +15599,8 @@
             <a:chExt cx="981706" cy="981706"/>
           </a:xfrm>
         </p:grpSpPr>
-        <mc:AlternateContent xmlns:mc="http://schemas.openxmlformats.org/markup-compatibility/2006">
-          <mc:Choice xmlns:p14="http://schemas.microsoft.com/office/powerpoint/2010/main" Requires="p14">
+        <mc:AlternateContent xmlns:mc="http://schemas.openxmlformats.org/markup-compatibility/2006" xmlns:p14="http://schemas.microsoft.com/office/powerpoint/2010/main">
+          <mc:Choice Requires="p14">
             <p:contentPart p14:bwMode="auto" r:id="rId3">
               <p14:nvContentPartPr>
                 <p14:cNvPr id="184" name="Ink 183">
@@ -15607,7 +15619,7 @@
               </p14:xfrm>
             </p:contentPart>
           </mc:Choice>
-          <mc:Fallback>
+          <mc:Fallback xmlns="">
             <p:pic>
               <p:nvPicPr>
                 <p:cNvPr id="184" name="Ink 183">
@@ -15638,8 +15650,8 @@
             </p:pic>
           </mc:Fallback>
         </mc:AlternateContent>
-        <mc:AlternateContent xmlns:mc="http://schemas.openxmlformats.org/markup-compatibility/2006">
-          <mc:Choice xmlns:p14="http://schemas.microsoft.com/office/powerpoint/2010/main" Requires="p14">
+        <mc:AlternateContent xmlns:mc="http://schemas.openxmlformats.org/markup-compatibility/2006" xmlns:p14="http://schemas.microsoft.com/office/powerpoint/2010/main">
+          <mc:Choice Requires="p14">
             <p:contentPart p14:bwMode="auto" r:id="rId5">
               <p14:nvContentPartPr>
                 <p14:cNvPr id="185" name="Ink 184">
@@ -15658,7 +15670,7 @@
               </p14:xfrm>
             </p:contentPart>
           </mc:Choice>
-          <mc:Fallback>
+          <mc:Fallback xmlns="">
             <p:pic>
               <p:nvPicPr>
                 <p:cNvPr id="185" name="Ink 184">
@@ -15689,8 +15701,8 @@
             </p:pic>
           </mc:Fallback>
         </mc:AlternateContent>
-        <mc:AlternateContent xmlns:mc="http://schemas.openxmlformats.org/markup-compatibility/2006">
-          <mc:Choice xmlns:p14="http://schemas.microsoft.com/office/powerpoint/2010/main" Requires="p14">
+        <mc:AlternateContent xmlns:mc="http://schemas.openxmlformats.org/markup-compatibility/2006" xmlns:p14="http://schemas.microsoft.com/office/powerpoint/2010/main">
+          <mc:Choice Requires="p14">
             <p:contentPart p14:bwMode="auto" r:id="rId7">
               <p14:nvContentPartPr>
                 <p14:cNvPr id="186" name="Ink 185">
@@ -15709,7 +15721,7 @@
               </p14:xfrm>
             </p:contentPart>
           </mc:Choice>
-          <mc:Fallback>
+          <mc:Fallback xmlns="">
             <p:pic>
               <p:nvPicPr>
                 <p:cNvPr id="186" name="Ink 185">
@@ -15740,8 +15752,8 @@
             </p:pic>
           </mc:Fallback>
         </mc:AlternateContent>
-        <mc:AlternateContent xmlns:mc="http://schemas.openxmlformats.org/markup-compatibility/2006">
-          <mc:Choice xmlns:p14="http://schemas.microsoft.com/office/powerpoint/2010/main" Requires="p14">
+        <mc:AlternateContent xmlns:mc="http://schemas.openxmlformats.org/markup-compatibility/2006" xmlns:p14="http://schemas.microsoft.com/office/powerpoint/2010/main">
+          <mc:Choice Requires="p14">
             <p:contentPart p14:bwMode="auto" r:id="rId9">
               <p14:nvContentPartPr>
                 <p14:cNvPr id="187" name="Ink 186">
@@ -15760,7 +15772,7 @@
               </p14:xfrm>
             </p:contentPart>
           </mc:Choice>
-          <mc:Fallback>
+          <mc:Fallback xmlns="">
             <p:pic>
               <p:nvPicPr>
                 <p:cNvPr id="187" name="Ink 186">
@@ -15843,8 +15855,8 @@
             </a:p>
           </p:txBody>
         </p:sp>
-        <mc:AlternateContent xmlns:mc="http://schemas.openxmlformats.org/markup-compatibility/2006">
-          <mc:Choice xmlns:p14="http://schemas.microsoft.com/office/powerpoint/2010/main" Requires="p14">
+        <mc:AlternateContent xmlns:mc="http://schemas.openxmlformats.org/markup-compatibility/2006" xmlns:p14="http://schemas.microsoft.com/office/powerpoint/2010/main">
+          <mc:Choice Requires="p14">
             <p:contentPart p14:bwMode="auto" r:id="rId11">
               <p14:nvContentPartPr>
                 <p14:cNvPr id="189" name="Ink 188">
@@ -15863,7 +15875,7 @@
               </p14:xfrm>
             </p:contentPart>
           </mc:Choice>
-          <mc:Fallback>
+          <mc:Fallback xmlns="">
             <p:pic>
               <p:nvPicPr>
                 <p:cNvPr id="189" name="Ink 188">
@@ -15894,8 +15906,8 @@
             </p:pic>
           </mc:Fallback>
         </mc:AlternateContent>
-        <mc:AlternateContent xmlns:mc="http://schemas.openxmlformats.org/markup-compatibility/2006">
-          <mc:Choice xmlns:p14="http://schemas.microsoft.com/office/powerpoint/2010/main" Requires="p14">
+        <mc:AlternateContent xmlns:mc="http://schemas.openxmlformats.org/markup-compatibility/2006" xmlns:p14="http://schemas.microsoft.com/office/powerpoint/2010/main">
+          <mc:Choice Requires="p14">
             <p:contentPart p14:bwMode="auto" r:id="rId13">
               <p14:nvContentPartPr>
                 <p14:cNvPr id="190" name="Ink 189">
@@ -15914,7 +15926,7 @@
               </p14:xfrm>
             </p:contentPart>
           </mc:Choice>
-          <mc:Fallback>
+          <mc:Fallback xmlns="">
             <p:pic>
               <p:nvPicPr>
                 <p:cNvPr id="190" name="Ink 189">
@@ -15945,8 +15957,8 @@
             </p:pic>
           </mc:Fallback>
         </mc:AlternateContent>
-        <mc:AlternateContent xmlns:mc="http://schemas.openxmlformats.org/markup-compatibility/2006">
-          <mc:Choice xmlns:p14="http://schemas.microsoft.com/office/powerpoint/2010/main" Requires="p14">
+        <mc:AlternateContent xmlns:mc="http://schemas.openxmlformats.org/markup-compatibility/2006" xmlns:p14="http://schemas.microsoft.com/office/powerpoint/2010/main">
+          <mc:Choice Requires="p14">
             <p:contentPart p14:bwMode="auto" r:id="rId15">
               <p14:nvContentPartPr>
                 <p14:cNvPr id="191" name="Ink 190">
@@ -15965,7 +15977,7 @@
               </p14:xfrm>
             </p:contentPart>
           </mc:Choice>
-          <mc:Fallback>
+          <mc:Fallback xmlns="">
             <p:pic>
               <p:nvPicPr>
                 <p:cNvPr id="191" name="Ink 190">
@@ -15996,8 +16008,8 @@
             </p:pic>
           </mc:Fallback>
         </mc:AlternateContent>
-        <mc:AlternateContent xmlns:mc="http://schemas.openxmlformats.org/markup-compatibility/2006">
-          <mc:Choice xmlns:p14="http://schemas.microsoft.com/office/powerpoint/2010/main" Requires="p14">
+        <mc:AlternateContent xmlns:mc="http://schemas.openxmlformats.org/markup-compatibility/2006" xmlns:p14="http://schemas.microsoft.com/office/powerpoint/2010/main">
+          <mc:Choice Requires="p14">
             <p:contentPart p14:bwMode="auto" r:id="rId17">
               <p14:nvContentPartPr>
                 <p14:cNvPr id="192" name="Ink 191">
@@ -16016,7 +16028,7 @@
               </p14:xfrm>
             </p:contentPart>
           </mc:Choice>
-          <mc:Fallback>
+          <mc:Fallback xmlns="">
             <p:pic>
               <p:nvPicPr>
                 <p:cNvPr id="192" name="Ink 191">
@@ -16047,8 +16059,8 @@
             </p:pic>
           </mc:Fallback>
         </mc:AlternateContent>
-        <mc:AlternateContent xmlns:mc="http://schemas.openxmlformats.org/markup-compatibility/2006">
-          <mc:Choice xmlns:p14="http://schemas.microsoft.com/office/powerpoint/2010/main" Requires="p14">
+        <mc:AlternateContent xmlns:mc="http://schemas.openxmlformats.org/markup-compatibility/2006" xmlns:p14="http://schemas.microsoft.com/office/powerpoint/2010/main">
+          <mc:Choice Requires="p14">
             <p:contentPart p14:bwMode="auto" r:id="rId19">
               <p14:nvContentPartPr>
                 <p14:cNvPr id="193" name="Ink 192">
@@ -16067,7 +16079,7 @@
               </p14:xfrm>
             </p:contentPart>
           </mc:Choice>
-          <mc:Fallback>
+          <mc:Fallback xmlns="">
             <p:pic>
               <p:nvPicPr>
                 <p:cNvPr id="193" name="Ink 192">
@@ -16098,8 +16110,8 @@
             </p:pic>
           </mc:Fallback>
         </mc:AlternateContent>
-        <mc:AlternateContent xmlns:mc="http://schemas.openxmlformats.org/markup-compatibility/2006">
-          <mc:Choice xmlns:p14="http://schemas.microsoft.com/office/powerpoint/2010/main" Requires="p14">
+        <mc:AlternateContent xmlns:mc="http://schemas.openxmlformats.org/markup-compatibility/2006" xmlns:p14="http://schemas.microsoft.com/office/powerpoint/2010/main">
+          <mc:Choice Requires="p14">
             <p:contentPart p14:bwMode="auto" r:id="rId21">
               <p14:nvContentPartPr>
                 <p14:cNvPr id="194" name="Ink 193">
@@ -16118,7 +16130,7 @@
               </p14:xfrm>
             </p:contentPart>
           </mc:Choice>
-          <mc:Fallback>
+          <mc:Fallback xmlns="">
             <p:pic>
               <p:nvPicPr>
                 <p:cNvPr id="194" name="Ink 193">
@@ -16149,8 +16161,8 @@
             </p:pic>
           </mc:Fallback>
         </mc:AlternateContent>
-        <mc:AlternateContent xmlns:mc="http://schemas.openxmlformats.org/markup-compatibility/2006">
-          <mc:Choice xmlns:p14="http://schemas.microsoft.com/office/powerpoint/2010/main" Requires="p14">
+        <mc:AlternateContent xmlns:mc="http://schemas.openxmlformats.org/markup-compatibility/2006" xmlns:p14="http://schemas.microsoft.com/office/powerpoint/2010/main">
+          <mc:Choice Requires="p14">
             <p:contentPart p14:bwMode="auto" r:id="rId23">
               <p14:nvContentPartPr>
                 <p14:cNvPr id="195" name="Ink 194">
@@ -16169,7 +16181,7 @@
               </p14:xfrm>
             </p:contentPart>
           </mc:Choice>
-          <mc:Fallback>
+          <mc:Fallback xmlns="">
             <p:pic>
               <p:nvPicPr>
                 <p:cNvPr id="195" name="Ink 194">
@@ -16200,8 +16212,8 @@
             </p:pic>
           </mc:Fallback>
         </mc:AlternateContent>
-        <mc:AlternateContent xmlns:mc="http://schemas.openxmlformats.org/markup-compatibility/2006">
-          <mc:Choice xmlns:p14="http://schemas.microsoft.com/office/powerpoint/2010/main" Requires="p14">
+        <mc:AlternateContent xmlns:mc="http://schemas.openxmlformats.org/markup-compatibility/2006" xmlns:p14="http://schemas.microsoft.com/office/powerpoint/2010/main">
+          <mc:Choice Requires="p14">
             <p:contentPart p14:bwMode="auto" r:id="rId25">
               <p14:nvContentPartPr>
                 <p14:cNvPr id="196" name="Ink 195">
@@ -16220,7 +16232,7 @@
               </p14:xfrm>
             </p:contentPart>
           </mc:Choice>
-          <mc:Fallback>
+          <mc:Fallback xmlns="">
             <p:pic>
               <p:nvPicPr>
                 <p:cNvPr id="196" name="Ink 195">
@@ -16251,8 +16263,8 @@
             </p:pic>
           </mc:Fallback>
         </mc:AlternateContent>
-        <mc:AlternateContent xmlns:mc="http://schemas.openxmlformats.org/markup-compatibility/2006">
-          <mc:Choice xmlns:p14="http://schemas.microsoft.com/office/powerpoint/2010/main" Requires="p14">
+        <mc:AlternateContent xmlns:mc="http://schemas.openxmlformats.org/markup-compatibility/2006" xmlns:p14="http://schemas.microsoft.com/office/powerpoint/2010/main">
+          <mc:Choice Requires="p14">
             <p:contentPart p14:bwMode="auto" r:id="rId27">
               <p14:nvContentPartPr>
                 <p14:cNvPr id="197" name="Ink 196">
@@ -16271,7 +16283,7 @@
               </p14:xfrm>
             </p:contentPart>
           </mc:Choice>
-          <mc:Fallback>
+          <mc:Fallback xmlns="">
             <p:pic>
               <p:nvPicPr>
                 <p:cNvPr id="197" name="Ink 196">
@@ -16302,8 +16314,8 @@
             </p:pic>
           </mc:Fallback>
         </mc:AlternateContent>
-        <mc:AlternateContent xmlns:mc="http://schemas.openxmlformats.org/markup-compatibility/2006">
-          <mc:Choice xmlns:p14="http://schemas.microsoft.com/office/powerpoint/2010/main" Requires="p14">
+        <mc:AlternateContent xmlns:mc="http://schemas.openxmlformats.org/markup-compatibility/2006" xmlns:p14="http://schemas.microsoft.com/office/powerpoint/2010/main">
+          <mc:Choice Requires="p14">
             <p:contentPart p14:bwMode="auto" r:id="rId29">
               <p14:nvContentPartPr>
                 <p14:cNvPr id="198" name="Ink 197">
@@ -16322,7 +16334,7 @@
               </p14:xfrm>
             </p:contentPart>
           </mc:Choice>
-          <mc:Fallback>
+          <mc:Fallback xmlns="">
             <p:pic>
               <p:nvPicPr>
                 <p:cNvPr id="198" name="Ink 197">
@@ -16373,8 +16385,8 @@
               <a:chExt cx="852120" cy="631080"/>
             </a:xfrm>
           </p:grpSpPr>
-          <mc:AlternateContent xmlns:mc="http://schemas.openxmlformats.org/markup-compatibility/2006">
-            <mc:Choice xmlns:p14="http://schemas.microsoft.com/office/powerpoint/2010/main" Requires="p14">
+          <mc:AlternateContent xmlns:mc="http://schemas.openxmlformats.org/markup-compatibility/2006" xmlns:p14="http://schemas.microsoft.com/office/powerpoint/2010/main">
+            <mc:Choice Requires="p14">
               <p:contentPart p14:bwMode="auto" r:id="rId31">
                 <p14:nvContentPartPr>
                   <p14:cNvPr id="200" name="Ink 199">
@@ -16393,7 +16405,7 @@
                 </p14:xfrm>
               </p:contentPart>
             </mc:Choice>
-            <mc:Fallback>
+            <mc:Fallback xmlns="">
               <p:pic>
                 <p:nvPicPr>
                   <p:cNvPr id="200" name="Ink 199">
@@ -16424,8 +16436,8 @@
               </p:pic>
             </mc:Fallback>
           </mc:AlternateContent>
-          <mc:AlternateContent xmlns:mc="http://schemas.openxmlformats.org/markup-compatibility/2006">
-            <mc:Choice xmlns:p14="http://schemas.microsoft.com/office/powerpoint/2010/main" Requires="p14">
+          <mc:AlternateContent xmlns:mc="http://schemas.openxmlformats.org/markup-compatibility/2006" xmlns:p14="http://schemas.microsoft.com/office/powerpoint/2010/main">
+            <mc:Choice Requires="p14">
               <p:contentPart p14:bwMode="auto" r:id="rId33">
                 <p14:nvContentPartPr>
                   <p14:cNvPr id="203" name="Ink 202">
@@ -16444,7 +16456,7 @@
                 </p14:xfrm>
               </p:contentPart>
             </mc:Choice>
-            <mc:Fallback>
+            <mc:Fallback xmlns="">
               <p:pic>
                 <p:nvPicPr>
                   <p:cNvPr id="203" name="Ink 202">
@@ -16475,8 +16487,8 @@
               </p:pic>
             </mc:Fallback>
           </mc:AlternateContent>
-          <mc:AlternateContent xmlns:mc="http://schemas.openxmlformats.org/markup-compatibility/2006">
-            <mc:Choice xmlns:p14="http://schemas.microsoft.com/office/powerpoint/2010/main" Requires="p14">
+          <mc:AlternateContent xmlns:mc="http://schemas.openxmlformats.org/markup-compatibility/2006" xmlns:p14="http://schemas.microsoft.com/office/powerpoint/2010/main">
+            <mc:Choice Requires="p14">
               <p:contentPart p14:bwMode="auto" r:id="rId34">
                 <p14:nvContentPartPr>
                   <p14:cNvPr id="204" name="Ink 203">
@@ -16495,7 +16507,7 @@
                 </p14:xfrm>
               </p:contentPart>
             </mc:Choice>
-            <mc:Fallback>
+            <mc:Fallback xmlns="">
               <p:pic>
                 <p:nvPicPr>
                   <p:cNvPr id="204" name="Ink 203">
@@ -16526,8 +16538,8 @@
               </p:pic>
             </mc:Fallback>
           </mc:AlternateContent>
-          <mc:AlternateContent xmlns:mc="http://schemas.openxmlformats.org/markup-compatibility/2006">
-            <mc:Choice xmlns:p14="http://schemas.microsoft.com/office/powerpoint/2010/main" Requires="p14">
+          <mc:AlternateContent xmlns:mc="http://schemas.openxmlformats.org/markup-compatibility/2006" xmlns:p14="http://schemas.microsoft.com/office/powerpoint/2010/main">
+            <mc:Choice Requires="p14">
               <p:contentPart p14:bwMode="auto" r:id="rId35">
                 <p14:nvContentPartPr>
                   <p14:cNvPr id="205" name="Ink 204">
@@ -16546,7 +16558,7 @@
                 </p14:xfrm>
               </p:contentPart>
             </mc:Choice>
-            <mc:Fallback>
+            <mc:Fallback xmlns="">
               <p:pic>
                 <p:nvPicPr>
                   <p:cNvPr id="205" name="Ink 204">
@@ -16577,8 +16589,8 @@
               </p:pic>
             </mc:Fallback>
           </mc:AlternateContent>
-          <mc:AlternateContent xmlns:mc="http://schemas.openxmlformats.org/markup-compatibility/2006">
-            <mc:Choice xmlns:p14="http://schemas.microsoft.com/office/powerpoint/2010/main" Requires="p14">
+          <mc:AlternateContent xmlns:mc="http://schemas.openxmlformats.org/markup-compatibility/2006" xmlns:p14="http://schemas.microsoft.com/office/powerpoint/2010/main">
+            <mc:Choice Requires="p14">
               <p:contentPart p14:bwMode="auto" r:id="rId36">
                 <p14:nvContentPartPr>
                   <p14:cNvPr id="206" name="Ink 205">
@@ -16597,7 +16609,7 @@
                 </p14:xfrm>
               </p:contentPart>
             </mc:Choice>
-            <mc:Fallback>
+            <mc:Fallback xmlns="">
               <p:pic>
                 <p:nvPicPr>
                   <p:cNvPr id="206" name="Ink 205">
@@ -16628,8 +16640,8 @@
               </p:pic>
             </mc:Fallback>
           </mc:AlternateContent>
-          <mc:AlternateContent xmlns:mc="http://schemas.openxmlformats.org/markup-compatibility/2006">
-            <mc:Choice xmlns:p14="http://schemas.microsoft.com/office/powerpoint/2010/main" Requires="p14">
+          <mc:AlternateContent xmlns:mc="http://schemas.openxmlformats.org/markup-compatibility/2006" xmlns:p14="http://schemas.microsoft.com/office/powerpoint/2010/main">
+            <mc:Choice Requires="p14">
               <p:contentPart p14:bwMode="auto" r:id="rId37">
                 <p14:nvContentPartPr>
                   <p14:cNvPr id="207" name="Ink 206">
@@ -16648,7 +16660,7 @@
                 </p14:xfrm>
               </p:contentPart>
             </mc:Choice>
-            <mc:Fallback>
+            <mc:Fallback xmlns="">
               <p:pic>
                 <p:nvPicPr>
                   <p:cNvPr id="207" name="Ink 206">
@@ -16679,8 +16691,8 @@
               </p:pic>
             </mc:Fallback>
           </mc:AlternateContent>
-          <mc:AlternateContent xmlns:mc="http://schemas.openxmlformats.org/markup-compatibility/2006">
-            <mc:Choice xmlns:p14="http://schemas.microsoft.com/office/powerpoint/2010/main" Requires="p14">
+          <mc:AlternateContent xmlns:mc="http://schemas.openxmlformats.org/markup-compatibility/2006" xmlns:p14="http://schemas.microsoft.com/office/powerpoint/2010/main">
+            <mc:Choice Requires="p14">
               <p:contentPart p14:bwMode="auto" r:id="rId38">
                 <p14:nvContentPartPr>
                   <p14:cNvPr id="208" name="Ink 207">
@@ -16699,7 +16711,7 @@
                 </p14:xfrm>
               </p:contentPart>
             </mc:Choice>
-            <mc:Fallback>
+            <mc:Fallback xmlns="">
               <p:pic>
                 <p:nvPicPr>
                   <p:cNvPr id="208" name="Ink 207">
@@ -16730,8 +16742,8 @@
               </p:pic>
             </mc:Fallback>
           </mc:AlternateContent>
-          <mc:AlternateContent xmlns:mc="http://schemas.openxmlformats.org/markup-compatibility/2006">
-            <mc:Choice xmlns:p14="http://schemas.microsoft.com/office/powerpoint/2010/main" Requires="p14">
+          <mc:AlternateContent xmlns:mc="http://schemas.openxmlformats.org/markup-compatibility/2006" xmlns:p14="http://schemas.microsoft.com/office/powerpoint/2010/main">
+            <mc:Choice Requires="p14">
               <p:contentPart p14:bwMode="auto" r:id="rId39">
                 <p14:nvContentPartPr>
                   <p14:cNvPr id="209" name="Ink 208">
@@ -16750,7 +16762,7 @@
                 </p14:xfrm>
               </p:contentPart>
             </mc:Choice>
-            <mc:Fallback>
+            <mc:Fallback xmlns="">
               <p:pic>
                 <p:nvPicPr>
                   <p:cNvPr id="209" name="Ink 208">
@@ -16781,8 +16793,8 @@
               </p:pic>
             </mc:Fallback>
           </mc:AlternateContent>
-          <mc:AlternateContent xmlns:mc="http://schemas.openxmlformats.org/markup-compatibility/2006">
-            <mc:Choice xmlns:p14="http://schemas.microsoft.com/office/powerpoint/2010/main" Requires="p14">
+          <mc:AlternateContent xmlns:mc="http://schemas.openxmlformats.org/markup-compatibility/2006" xmlns:p14="http://schemas.microsoft.com/office/powerpoint/2010/main">
+            <mc:Choice Requires="p14">
               <p:contentPart p14:bwMode="auto" r:id="rId40">
                 <p14:nvContentPartPr>
                   <p14:cNvPr id="210" name="Ink 209">
@@ -16801,7 +16813,7 @@
                 </p14:xfrm>
               </p:contentPart>
             </mc:Choice>
-            <mc:Fallback>
+            <mc:Fallback xmlns="">
               <p:pic>
                 <p:nvPicPr>
                   <p:cNvPr id="210" name="Ink 209">
@@ -16832,8 +16844,8 @@
               </p:pic>
             </mc:Fallback>
           </mc:AlternateContent>
-          <mc:AlternateContent xmlns:mc="http://schemas.openxmlformats.org/markup-compatibility/2006">
-            <mc:Choice xmlns:p14="http://schemas.microsoft.com/office/powerpoint/2010/main" Requires="p14">
+          <mc:AlternateContent xmlns:mc="http://schemas.openxmlformats.org/markup-compatibility/2006" xmlns:p14="http://schemas.microsoft.com/office/powerpoint/2010/main">
+            <mc:Choice Requires="p14">
               <p:contentPart p14:bwMode="auto" r:id="rId41">
                 <p14:nvContentPartPr>
                   <p14:cNvPr id="211" name="Ink 210">
@@ -16852,7 +16864,7 @@
                 </p14:xfrm>
               </p:contentPart>
             </mc:Choice>
-            <mc:Fallback>
+            <mc:Fallback xmlns="">
               <p:pic>
                 <p:nvPicPr>
                   <p:cNvPr id="211" name="Ink 210">
@@ -16883,8 +16895,8 @@
               </p:pic>
             </mc:Fallback>
           </mc:AlternateContent>
-          <mc:AlternateContent xmlns:mc="http://schemas.openxmlformats.org/markup-compatibility/2006">
-            <mc:Choice xmlns:p14="http://schemas.microsoft.com/office/powerpoint/2010/main" Requires="p14">
+          <mc:AlternateContent xmlns:mc="http://schemas.openxmlformats.org/markup-compatibility/2006" xmlns:p14="http://schemas.microsoft.com/office/powerpoint/2010/main">
+            <mc:Choice Requires="p14">
               <p:contentPart p14:bwMode="auto" r:id="rId43">
                 <p14:nvContentPartPr>
                   <p14:cNvPr id="212" name="Ink 211">
@@ -16903,7 +16915,7 @@
                 </p14:xfrm>
               </p:contentPart>
             </mc:Choice>
-            <mc:Fallback>
+            <mc:Fallback xmlns="">
               <p:pic>
                 <p:nvPicPr>
                   <p:cNvPr id="212" name="Ink 211">
@@ -16934,8 +16946,8 @@
               </p:pic>
             </mc:Fallback>
           </mc:AlternateContent>
-          <mc:AlternateContent xmlns:mc="http://schemas.openxmlformats.org/markup-compatibility/2006">
-            <mc:Choice xmlns:p14="http://schemas.microsoft.com/office/powerpoint/2010/main" Requires="p14">
+          <mc:AlternateContent xmlns:mc="http://schemas.openxmlformats.org/markup-compatibility/2006" xmlns:p14="http://schemas.microsoft.com/office/powerpoint/2010/main">
+            <mc:Choice Requires="p14">
               <p:contentPart p14:bwMode="auto" r:id="rId45">
                 <p14:nvContentPartPr>
                   <p14:cNvPr id="213" name="Ink 212">
@@ -16954,7 +16966,7 @@
                 </p14:xfrm>
               </p:contentPart>
             </mc:Choice>
-            <mc:Fallback>
+            <mc:Fallback xmlns="">
               <p:pic>
                 <p:nvPicPr>
                   <p:cNvPr id="213" name="Ink 212">
@@ -16985,8 +16997,8 @@
               </p:pic>
             </mc:Fallback>
           </mc:AlternateContent>
-          <mc:AlternateContent xmlns:mc="http://schemas.openxmlformats.org/markup-compatibility/2006">
-            <mc:Choice xmlns:p14="http://schemas.microsoft.com/office/powerpoint/2010/main" Requires="p14">
+          <mc:AlternateContent xmlns:mc="http://schemas.openxmlformats.org/markup-compatibility/2006" xmlns:p14="http://schemas.microsoft.com/office/powerpoint/2010/main">
+            <mc:Choice Requires="p14">
               <p:contentPart p14:bwMode="auto" r:id="rId46">
                 <p14:nvContentPartPr>
                   <p14:cNvPr id="214" name="Ink 213">
@@ -17005,7 +17017,7 @@
                 </p14:xfrm>
               </p:contentPart>
             </mc:Choice>
-            <mc:Fallback>
+            <mc:Fallback xmlns="">
               <p:pic>
                 <p:nvPicPr>
                   <p:cNvPr id="214" name="Ink 213">
@@ -17036,8 +17048,8 @@
               </p:pic>
             </mc:Fallback>
           </mc:AlternateContent>
-          <mc:AlternateContent xmlns:mc="http://schemas.openxmlformats.org/markup-compatibility/2006">
-            <mc:Choice xmlns:p14="http://schemas.microsoft.com/office/powerpoint/2010/main" Requires="p14">
+          <mc:AlternateContent xmlns:mc="http://schemas.openxmlformats.org/markup-compatibility/2006" xmlns:p14="http://schemas.microsoft.com/office/powerpoint/2010/main">
+            <mc:Choice Requires="p14">
               <p:contentPart p14:bwMode="auto" r:id="rId47">
                 <p14:nvContentPartPr>
                   <p14:cNvPr id="215" name="Ink 214">
@@ -17056,7 +17068,7 @@
                 </p14:xfrm>
               </p:contentPart>
             </mc:Choice>
-            <mc:Fallback>
+            <mc:Fallback xmlns="">
               <p:pic>
                 <p:nvPicPr>
                   <p:cNvPr id="215" name="Ink 214">
@@ -17087,8 +17099,8 @@
               </p:pic>
             </mc:Fallback>
           </mc:AlternateContent>
-          <mc:AlternateContent xmlns:mc="http://schemas.openxmlformats.org/markup-compatibility/2006">
-            <mc:Choice xmlns:p14="http://schemas.microsoft.com/office/powerpoint/2010/main" Requires="p14">
+          <mc:AlternateContent xmlns:mc="http://schemas.openxmlformats.org/markup-compatibility/2006" xmlns:p14="http://schemas.microsoft.com/office/powerpoint/2010/main">
+            <mc:Choice Requires="p14">
               <p:contentPart p14:bwMode="auto" r:id="rId48">
                 <p14:nvContentPartPr>
                   <p14:cNvPr id="216" name="Ink 215">
@@ -17107,7 +17119,7 @@
                 </p14:xfrm>
               </p:contentPart>
             </mc:Choice>
-            <mc:Fallback>
+            <mc:Fallback xmlns="">
               <p:pic>
                 <p:nvPicPr>
                   <p:cNvPr id="216" name="Ink 215">
@@ -17138,8 +17150,8 @@
               </p:pic>
             </mc:Fallback>
           </mc:AlternateContent>
-          <mc:AlternateContent xmlns:mc="http://schemas.openxmlformats.org/markup-compatibility/2006">
-            <mc:Choice xmlns:p14="http://schemas.microsoft.com/office/powerpoint/2010/main" Requires="p14">
+          <mc:AlternateContent xmlns:mc="http://schemas.openxmlformats.org/markup-compatibility/2006" xmlns:p14="http://schemas.microsoft.com/office/powerpoint/2010/main">
+            <mc:Choice Requires="p14">
               <p:contentPart p14:bwMode="auto" r:id="rId49">
                 <p14:nvContentPartPr>
                   <p14:cNvPr id="217" name="Ink 216">
@@ -17158,7 +17170,7 @@
                 </p14:xfrm>
               </p:contentPart>
             </mc:Choice>
-            <mc:Fallback>
+            <mc:Fallback xmlns="">
               <p:pic>
                 <p:nvPicPr>
                   <p:cNvPr id="217" name="Ink 216">
@@ -17189,8 +17201,8 @@
               </p:pic>
             </mc:Fallback>
           </mc:AlternateContent>
-          <mc:AlternateContent xmlns:mc="http://schemas.openxmlformats.org/markup-compatibility/2006">
-            <mc:Choice xmlns:p14="http://schemas.microsoft.com/office/powerpoint/2010/main" Requires="p14">
+          <mc:AlternateContent xmlns:mc="http://schemas.openxmlformats.org/markup-compatibility/2006" xmlns:p14="http://schemas.microsoft.com/office/powerpoint/2010/main">
+            <mc:Choice Requires="p14">
               <p:contentPart p14:bwMode="auto" r:id="rId50">
                 <p14:nvContentPartPr>
                   <p14:cNvPr id="218" name="Ink 217">
@@ -17209,7 +17221,7 @@
                 </p14:xfrm>
               </p:contentPart>
             </mc:Choice>
-            <mc:Fallback>
+            <mc:Fallback xmlns="">
               <p:pic>
                 <p:nvPicPr>
                   <p:cNvPr id="218" name="Ink 217">
@@ -17240,8 +17252,8 @@
               </p:pic>
             </mc:Fallback>
           </mc:AlternateContent>
-          <mc:AlternateContent xmlns:mc="http://schemas.openxmlformats.org/markup-compatibility/2006">
-            <mc:Choice xmlns:p14="http://schemas.microsoft.com/office/powerpoint/2010/main" Requires="p14">
+          <mc:AlternateContent xmlns:mc="http://schemas.openxmlformats.org/markup-compatibility/2006" xmlns:p14="http://schemas.microsoft.com/office/powerpoint/2010/main">
+            <mc:Choice Requires="p14">
               <p:contentPart p14:bwMode="auto" r:id="rId51">
                 <p14:nvContentPartPr>
                   <p14:cNvPr id="219" name="Ink 218">
@@ -17260,7 +17272,7 @@
                 </p14:xfrm>
               </p:contentPart>
             </mc:Choice>
-            <mc:Fallback>
+            <mc:Fallback xmlns="">
               <p:pic>
                 <p:nvPicPr>
                   <p:cNvPr id="219" name="Ink 218">
@@ -17291,8 +17303,8 @@
               </p:pic>
             </mc:Fallback>
           </mc:AlternateContent>
-          <mc:AlternateContent xmlns:mc="http://schemas.openxmlformats.org/markup-compatibility/2006">
-            <mc:Choice xmlns:p14="http://schemas.microsoft.com/office/powerpoint/2010/main" Requires="p14">
+          <mc:AlternateContent xmlns:mc="http://schemas.openxmlformats.org/markup-compatibility/2006" xmlns:p14="http://schemas.microsoft.com/office/powerpoint/2010/main">
+            <mc:Choice Requires="p14">
               <p:contentPart p14:bwMode="auto" r:id="rId52">
                 <p14:nvContentPartPr>
                   <p14:cNvPr id="220" name="Ink 219">
@@ -17311,7 +17323,7 @@
                 </p14:xfrm>
               </p:contentPart>
             </mc:Choice>
-            <mc:Fallback>
+            <mc:Fallback xmlns="">
               <p:pic>
                 <p:nvPicPr>
                   <p:cNvPr id="220" name="Ink 219">
@@ -17342,8 +17354,8 @@
               </p:pic>
             </mc:Fallback>
           </mc:AlternateContent>
-          <mc:AlternateContent xmlns:mc="http://schemas.openxmlformats.org/markup-compatibility/2006">
-            <mc:Choice xmlns:p14="http://schemas.microsoft.com/office/powerpoint/2010/main" Requires="p14">
+          <mc:AlternateContent xmlns:mc="http://schemas.openxmlformats.org/markup-compatibility/2006" xmlns:p14="http://schemas.microsoft.com/office/powerpoint/2010/main">
+            <mc:Choice Requires="p14">
               <p:contentPart p14:bwMode="auto" r:id="rId53">
                 <p14:nvContentPartPr>
                   <p14:cNvPr id="221" name="Ink 220">
@@ -17362,7 +17374,7 @@
                 </p14:xfrm>
               </p:contentPart>
             </mc:Choice>
-            <mc:Fallback>
+            <mc:Fallback xmlns="">
               <p:pic>
                 <p:nvPicPr>
                   <p:cNvPr id="221" name="Ink 220">
@@ -17393,8 +17405,8 @@
               </p:pic>
             </mc:Fallback>
           </mc:AlternateContent>
-          <mc:AlternateContent xmlns:mc="http://schemas.openxmlformats.org/markup-compatibility/2006">
-            <mc:Choice xmlns:p14="http://schemas.microsoft.com/office/powerpoint/2010/main" Requires="p14">
+          <mc:AlternateContent xmlns:mc="http://schemas.openxmlformats.org/markup-compatibility/2006" xmlns:p14="http://schemas.microsoft.com/office/powerpoint/2010/main">
+            <mc:Choice Requires="p14">
               <p:contentPart p14:bwMode="auto" r:id="rId55">
                 <p14:nvContentPartPr>
                   <p14:cNvPr id="222" name="Ink 221">
@@ -17413,7 +17425,7 @@
                 </p14:xfrm>
               </p:contentPart>
             </mc:Choice>
-            <mc:Fallback>
+            <mc:Fallback xmlns="">
               <p:pic>
                 <p:nvPicPr>
                   <p:cNvPr id="222" name="Ink 221">
@@ -17444,8 +17456,8 @@
               </p:pic>
             </mc:Fallback>
           </mc:AlternateContent>
-          <mc:AlternateContent xmlns:mc="http://schemas.openxmlformats.org/markup-compatibility/2006">
-            <mc:Choice xmlns:p14="http://schemas.microsoft.com/office/powerpoint/2010/main" Requires="p14">
+          <mc:AlternateContent xmlns:mc="http://schemas.openxmlformats.org/markup-compatibility/2006" xmlns:p14="http://schemas.microsoft.com/office/powerpoint/2010/main">
+            <mc:Choice Requires="p14">
               <p:contentPart p14:bwMode="auto" r:id="rId57">
                 <p14:nvContentPartPr>
                   <p14:cNvPr id="223" name="Ink 222">
@@ -17464,7 +17476,7 @@
                 </p14:xfrm>
               </p:contentPart>
             </mc:Choice>
-            <mc:Fallback>
+            <mc:Fallback xmlns="">
               <p:pic>
                 <p:nvPicPr>
                   <p:cNvPr id="223" name="Ink 222">
@@ -17495,8 +17507,8 @@
               </p:pic>
             </mc:Fallback>
           </mc:AlternateContent>
-          <mc:AlternateContent xmlns:mc="http://schemas.openxmlformats.org/markup-compatibility/2006">
-            <mc:Choice xmlns:p14="http://schemas.microsoft.com/office/powerpoint/2010/main" Requires="p14">
+          <mc:AlternateContent xmlns:mc="http://schemas.openxmlformats.org/markup-compatibility/2006" xmlns:p14="http://schemas.microsoft.com/office/powerpoint/2010/main">
+            <mc:Choice Requires="p14">
               <p:contentPart p14:bwMode="auto" r:id="rId59">
                 <p14:nvContentPartPr>
                   <p14:cNvPr id="224" name="Ink 223">
@@ -17515,7 +17527,7 @@
                 </p14:xfrm>
               </p:contentPart>
             </mc:Choice>
-            <mc:Fallback>
+            <mc:Fallback xmlns="">
               <p:pic>
                 <p:nvPicPr>
                   <p:cNvPr id="224" name="Ink 223">
@@ -17546,8 +17558,8 @@
               </p:pic>
             </mc:Fallback>
           </mc:AlternateContent>
-          <mc:AlternateContent xmlns:mc="http://schemas.openxmlformats.org/markup-compatibility/2006">
-            <mc:Choice xmlns:p14="http://schemas.microsoft.com/office/powerpoint/2010/main" Requires="p14">
+          <mc:AlternateContent xmlns:mc="http://schemas.openxmlformats.org/markup-compatibility/2006" xmlns:p14="http://schemas.microsoft.com/office/powerpoint/2010/main">
+            <mc:Choice Requires="p14">
               <p:contentPart p14:bwMode="auto" r:id="rId60">
                 <p14:nvContentPartPr>
                   <p14:cNvPr id="225" name="Ink 224">
@@ -17566,7 +17578,7 @@
                 </p14:xfrm>
               </p:contentPart>
             </mc:Choice>
-            <mc:Fallback>
+            <mc:Fallback xmlns="">
               <p:pic>
                 <p:nvPicPr>
                   <p:cNvPr id="225" name="Ink 224">
@@ -17597,8 +17609,8 @@
               </p:pic>
             </mc:Fallback>
           </mc:AlternateContent>
-          <mc:AlternateContent xmlns:mc="http://schemas.openxmlformats.org/markup-compatibility/2006">
-            <mc:Choice xmlns:p14="http://schemas.microsoft.com/office/powerpoint/2010/main" Requires="p14">
+          <mc:AlternateContent xmlns:mc="http://schemas.openxmlformats.org/markup-compatibility/2006" xmlns:p14="http://schemas.microsoft.com/office/powerpoint/2010/main">
+            <mc:Choice Requires="p14">
               <p:contentPart p14:bwMode="auto" r:id="rId62">
                 <p14:nvContentPartPr>
                   <p14:cNvPr id="226" name="Ink 225">
@@ -17617,7 +17629,7 @@
                 </p14:xfrm>
               </p:contentPart>
             </mc:Choice>
-            <mc:Fallback>
+            <mc:Fallback xmlns="">
               <p:pic>
                 <p:nvPicPr>
                   <p:cNvPr id="226" name="Ink 225">
@@ -17648,8 +17660,8 @@
               </p:pic>
             </mc:Fallback>
           </mc:AlternateContent>
-          <mc:AlternateContent xmlns:mc="http://schemas.openxmlformats.org/markup-compatibility/2006">
-            <mc:Choice xmlns:p14="http://schemas.microsoft.com/office/powerpoint/2010/main" Requires="p14">
+          <mc:AlternateContent xmlns:mc="http://schemas.openxmlformats.org/markup-compatibility/2006" xmlns:p14="http://schemas.microsoft.com/office/powerpoint/2010/main">
+            <mc:Choice Requires="p14">
               <p:contentPart p14:bwMode="auto" r:id="rId64">
                 <p14:nvContentPartPr>
                   <p14:cNvPr id="227" name="Ink 226">
@@ -17668,7 +17680,7 @@
                 </p14:xfrm>
               </p:contentPart>
             </mc:Choice>
-            <mc:Fallback>
+            <mc:Fallback xmlns="">
               <p:pic>
                 <p:nvPicPr>
                   <p:cNvPr id="227" name="Ink 226">
@@ -17699,8 +17711,8 @@
               </p:pic>
             </mc:Fallback>
           </mc:AlternateContent>
-          <mc:AlternateContent xmlns:mc="http://schemas.openxmlformats.org/markup-compatibility/2006">
-            <mc:Choice xmlns:p14="http://schemas.microsoft.com/office/powerpoint/2010/main" Requires="p14">
+          <mc:AlternateContent xmlns:mc="http://schemas.openxmlformats.org/markup-compatibility/2006" xmlns:p14="http://schemas.microsoft.com/office/powerpoint/2010/main">
+            <mc:Choice Requires="p14">
               <p:contentPart p14:bwMode="auto" r:id="rId66">
                 <p14:nvContentPartPr>
                   <p14:cNvPr id="228" name="Ink 227">
@@ -17719,7 +17731,7 @@
                 </p14:xfrm>
               </p:contentPart>
             </mc:Choice>
-            <mc:Fallback>
+            <mc:Fallback xmlns="">
               <p:pic>
                 <p:nvPicPr>
                   <p:cNvPr id="228" name="Ink 227">
@@ -17750,8 +17762,8 @@
               </p:pic>
             </mc:Fallback>
           </mc:AlternateContent>
-          <mc:AlternateContent xmlns:mc="http://schemas.openxmlformats.org/markup-compatibility/2006">
-            <mc:Choice xmlns:p14="http://schemas.microsoft.com/office/powerpoint/2010/main" Requires="p14">
+          <mc:AlternateContent xmlns:mc="http://schemas.openxmlformats.org/markup-compatibility/2006" xmlns:p14="http://schemas.microsoft.com/office/powerpoint/2010/main">
+            <mc:Choice Requires="p14">
               <p:contentPart p14:bwMode="auto" r:id="rId68">
                 <p14:nvContentPartPr>
                   <p14:cNvPr id="229" name="Ink 228">
@@ -17770,7 +17782,7 @@
                 </p14:xfrm>
               </p:contentPart>
             </mc:Choice>
-            <mc:Fallback>
+            <mc:Fallback xmlns="">
               <p:pic>
                 <p:nvPicPr>
                   <p:cNvPr id="229" name="Ink 228">
@@ -17801,8 +17813,8 @@
               </p:pic>
             </mc:Fallback>
           </mc:AlternateContent>
-          <mc:AlternateContent xmlns:mc="http://schemas.openxmlformats.org/markup-compatibility/2006">
-            <mc:Choice xmlns:p14="http://schemas.microsoft.com/office/powerpoint/2010/main" Requires="p14">
+          <mc:AlternateContent xmlns:mc="http://schemas.openxmlformats.org/markup-compatibility/2006" xmlns:p14="http://schemas.microsoft.com/office/powerpoint/2010/main">
+            <mc:Choice Requires="p14">
               <p:contentPart p14:bwMode="auto" r:id="rId70">
                 <p14:nvContentPartPr>
                   <p14:cNvPr id="230" name="Ink 229">
@@ -17821,7 +17833,7 @@
                 </p14:xfrm>
               </p:contentPart>
             </mc:Choice>
-            <mc:Fallback>
+            <mc:Fallback xmlns="">
               <p:pic>
                 <p:nvPicPr>
                   <p:cNvPr id="230" name="Ink 229">
@@ -17852,8 +17864,8 @@
               </p:pic>
             </mc:Fallback>
           </mc:AlternateContent>
-          <mc:AlternateContent xmlns:mc="http://schemas.openxmlformats.org/markup-compatibility/2006">
-            <mc:Choice xmlns:p14="http://schemas.microsoft.com/office/powerpoint/2010/main" Requires="p14">
+          <mc:AlternateContent xmlns:mc="http://schemas.openxmlformats.org/markup-compatibility/2006" xmlns:p14="http://schemas.microsoft.com/office/powerpoint/2010/main">
+            <mc:Choice Requires="p14">
               <p:contentPart p14:bwMode="auto" r:id="rId72">
                 <p14:nvContentPartPr>
                   <p14:cNvPr id="231" name="Ink 230">
@@ -17872,7 +17884,7 @@
                 </p14:xfrm>
               </p:contentPart>
             </mc:Choice>
-            <mc:Fallback>
+            <mc:Fallback xmlns="">
               <p:pic>
                 <p:nvPicPr>
                   <p:cNvPr id="231" name="Ink 230">
@@ -17903,8 +17915,8 @@
               </p:pic>
             </mc:Fallback>
           </mc:AlternateContent>
-          <mc:AlternateContent xmlns:mc="http://schemas.openxmlformats.org/markup-compatibility/2006">
-            <mc:Choice xmlns:p14="http://schemas.microsoft.com/office/powerpoint/2010/main" Requires="p14">
+          <mc:AlternateContent xmlns:mc="http://schemas.openxmlformats.org/markup-compatibility/2006" xmlns:p14="http://schemas.microsoft.com/office/powerpoint/2010/main">
+            <mc:Choice Requires="p14">
               <p:contentPart p14:bwMode="auto" r:id="rId74">
                 <p14:nvContentPartPr>
                   <p14:cNvPr id="232" name="Ink 231">
@@ -17923,7 +17935,7 @@
                 </p14:xfrm>
               </p:contentPart>
             </mc:Choice>
-            <mc:Fallback>
+            <mc:Fallback xmlns="">
               <p:pic>
                 <p:nvPicPr>
                   <p:cNvPr id="232" name="Ink 231">
@@ -17954,8 +17966,8 @@
               </p:pic>
             </mc:Fallback>
           </mc:AlternateContent>
-          <mc:AlternateContent xmlns:mc="http://schemas.openxmlformats.org/markup-compatibility/2006">
-            <mc:Choice xmlns:p14="http://schemas.microsoft.com/office/powerpoint/2010/main" Requires="p14">
+          <mc:AlternateContent xmlns:mc="http://schemas.openxmlformats.org/markup-compatibility/2006" xmlns:p14="http://schemas.microsoft.com/office/powerpoint/2010/main">
+            <mc:Choice Requires="p14">
               <p:contentPart p14:bwMode="auto" r:id="rId75">
                 <p14:nvContentPartPr>
                   <p14:cNvPr id="233" name="Ink 232">
@@ -17974,7 +17986,7 @@
                 </p14:xfrm>
               </p:contentPart>
             </mc:Choice>
-            <mc:Fallback>
+            <mc:Fallback xmlns="">
               <p:pic>
                 <p:nvPicPr>
                   <p:cNvPr id="233" name="Ink 232">
@@ -18005,8 +18017,8 @@
               </p:pic>
             </mc:Fallback>
           </mc:AlternateContent>
-          <mc:AlternateContent xmlns:mc="http://schemas.openxmlformats.org/markup-compatibility/2006">
-            <mc:Choice xmlns:p14="http://schemas.microsoft.com/office/powerpoint/2010/main" Requires="p14">
+          <mc:AlternateContent xmlns:mc="http://schemas.openxmlformats.org/markup-compatibility/2006" xmlns:p14="http://schemas.microsoft.com/office/powerpoint/2010/main">
+            <mc:Choice Requires="p14">
               <p:contentPart p14:bwMode="auto" r:id="rId77">
                 <p14:nvContentPartPr>
                   <p14:cNvPr id="234" name="Ink 233">
@@ -18025,7 +18037,7 @@
                 </p14:xfrm>
               </p:contentPart>
             </mc:Choice>
-            <mc:Fallback>
+            <mc:Fallback xmlns="">
               <p:pic>
                 <p:nvPicPr>
                   <p:cNvPr id="234" name="Ink 233">
@@ -18056,8 +18068,8 @@
               </p:pic>
             </mc:Fallback>
           </mc:AlternateContent>
-          <mc:AlternateContent xmlns:mc="http://schemas.openxmlformats.org/markup-compatibility/2006">
-            <mc:Choice xmlns:p14="http://schemas.microsoft.com/office/powerpoint/2010/main" Requires="p14">
+          <mc:AlternateContent xmlns:mc="http://schemas.openxmlformats.org/markup-compatibility/2006" xmlns:p14="http://schemas.microsoft.com/office/powerpoint/2010/main">
+            <mc:Choice Requires="p14">
               <p:contentPart p14:bwMode="auto" r:id="rId78">
                 <p14:nvContentPartPr>
                   <p14:cNvPr id="235" name="Ink 234">
@@ -18076,7 +18088,7 @@
                 </p14:xfrm>
               </p:contentPart>
             </mc:Choice>
-            <mc:Fallback>
+            <mc:Fallback xmlns="">
               <p:pic>
                 <p:nvPicPr>
                   <p:cNvPr id="235" name="Ink 234">
@@ -18107,8 +18119,8 @@
               </p:pic>
             </mc:Fallback>
           </mc:AlternateContent>
-          <mc:AlternateContent xmlns:mc="http://schemas.openxmlformats.org/markup-compatibility/2006">
-            <mc:Choice xmlns:p14="http://schemas.microsoft.com/office/powerpoint/2010/main" Requires="p14">
+          <mc:AlternateContent xmlns:mc="http://schemas.openxmlformats.org/markup-compatibility/2006" xmlns:p14="http://schemas.microsoft.com/office/powerpoint/2010/main">
+            <mc:Choice Requires="p14">
               <p:contentPart p14:bwMode="auto" r:id="rId79">
                 <p14:nvContentPartPr>
                   <p14:cNvPr id="236" name="Ink 235">
@@ -18127,7 +18139,7 @@
                 </p14:xfrm>
               </p:contentPart>
             </mc:Choice>
-            <mc:Fallback>
+            <mc:Fallback xmlns="">
               <p:pic>
                 <p:nvPicPr>
                   <p:cNvPr id="236" name="Ink 235">
@@ -18158,8 +18170,8 @@
               </p:pic>
             </mc:Fallback>
           </mc:AlternateContent>
-          <mc:AlternateContent xmlns:mc="http://schemas.openxmlformats.org/markup-compatibility/2006">
-            <mc:Choice xmlns:p14="http://schemas.microsoft.com/office/powerpoint/2010/main" Requires="p14">
+          <mc:AlternateContent xmlns:mc="http://schemas.openxmlformats.org/markup-compatibility/2006" xmlns:p14="http://schemas.microsoft.com/office/powerpoint/2010/main">
+            <mc:Choice Requires="p14">
               <p:contentPart p14:bwMode="auto" r:id="rId80">
                 <p14:nvContentPartPr>
                   <p14:cNvPr id="237" name="Ink 236">
@@ -18178,7 +18190,7 @@
                 </p14:xfrm>
               </p:contentPart>
             </mc:Choice>
-            <mc:Fallback>
+            <mc:Fallback xmlns="">
               <p:pic>
                 <p:nvPicPr>
                   <p:cNvPr id="237" name="Ink 236">
@@ -18209,8 +18221,8 @@
               </p:pic>
             </mc:Fallback>
           </mc:AlternateContent>
-          <mc:AlternateContent xmlns:mc="http://schemas.openxmlformats.org/markup-compatibility/2006">
-            <mc:Choice xmlns:p14="http://schemas.microsoft.com/office/powerpoint/2010/main" Requires="p14">
+          <mc:AlternateContent xmlns:mc="http://schemas.openxmlformats.org/markup-compatibility/2006" xmlns:p14="http://schemas.microsoft.com/office/powerpoint/2010/main">
+            <mc:Choice Requires="p14">
               <p:contentPart p14:bwMode="auto" r:id="rId81">
                 <p14:nvContentPartPr>
                   <p14:cNvPr id="238" name="Ink 237">
@@ -18229,7 +18241,7 @@
                 </p14:xfrm>
               </p:contentPart>
             </mc:Choice>
-            <mc:Fallback>
+            <mc:Fallback xmlns="">
               <p:pic>
                 <p:nvPicPr>
                   <p:cNvPr id="238" name="Ink 237">
@@ -18260,8 +18272,8 @@
               </p:pic>
             </mc:Fallback>
           </mc:AlternateContent>
-          <mc:AlternateContent xmlns:mc="http://schemas.openxmlformats.org/markup-compatibility/2006">
-            <mc:Choice xmlns:p14="http://schemas.microsoft.com/office/powerpoint/2010/main" Requires="p14">
+          <mc:AlternateContent xmlns:mc="http://schemas.openxmlformats.org/markup-compatibility/2006" xmlns:p14="http://schemas.microsoft.com/office/powerpoint/2010/main">
+            <mc:Choice Requires="p14">
               <p:contentPart p14:bwMode="auto" r:id="rId83">
                 <p14:nvContentPartPr>
                   <p14:cNvPr id="239" name="Ink 238">
@@ -18280,7 +18292,7 @@
                 </p14:xfrm>
               </p:contentPart>
             </mc:Choice>
-            <mc:Fallback>
+            <mc:Fallback xmlns="">
               <p:pic>
                 <p:nvPicPr>
                   <p:cNvPr id="239" name="Ink 238">
@@ -18311,8 +18323,8 @@
               </p:pic>
             </mc:Fallback>
           </mc:AlternateContent>
-          <mc:AlternateContent xmlns:mc="http://schemas.openxmlformats.org/markup-compatibility/2006">
-            <mc:Choice xmlns:p14="http://schemas.microsoft.com/office/powerpoint/2010/main" Requires="p14">
+          <mc:AlternateContent xmlns:mc="http://schemas.openxmlformats.org/markup-compatibility/2006" xmlns:p14="http://schemas.microsoft.com/office/powerpoint/2010/main">
+            <mc:Choice Requires="p14">
               <p:contentPart p14:bwMode="auto" r:id="rId85">
                 <p14:nvContentPartPr>
                   <p14:cNvPr id="240" name="Ink 239">
@@ -18331,7 +18343,7 @@
                 </p14:xfrm>
               </p:contentPart>
             </mc:Choice>
-            <mc:Fallback>
+            <mc:Fallback xmlns="">
               <p:pic>
                 <p:nvPicPr>
                   <p:cNvPr id="240" name="Ink 239">
@@ -18362,8 +18374,8 @@
               </p:pic>
             </mc:Fallback>
           </mc:AlternateContent>
-          <mc:AlternateContent xmlns:mc="http://schemas.openxmlformats.org/markup-compatibility/2006">
-            <mc:Choice xmlns:p14="http://schemas.microsoft.com/office/powerpoint/2010/main" Requires="p14">
+          <mc:AlternateContent xmlns:mc="http://schemas.openxmlformats.org/markup-compatibility/2006" xmlns:p14="http://schemas.microsoft.com/office/powerpoint/2010/main">
+            <mc:Choice Requires="p14">
               <p:contentPart p14:bwMode="auto" r:id="rId87">
                 <p14:nvContentPartPr>
                   <p14:cNvPr id="241" name="Ink 240">
@@ -18382,7 +18394,7 @@
                 </p14:xfrm>
               </p:contentPart>
             </mc:Choice>
-            <mc:Fallback>
+            <mc:Fallback xmlns="">
               <p:pic>
                 <p:nvPicPr>
                   <p:cNvPr id="241" name="Ink 240">
@@ -18413,8 +18425,8 @@
               </p:pic>
             </mc:Fallback>
           </mc:AlternateContent>
-          <mc:AlternateContent xmlns:mc="http://schemas.openxmlformats.org/markup-compatibility/2006">
-            <mc:Choice xmlns:p14="http://schemas.microsoft.com/office/powerpoint/2010/main" Requires="p14">
+          <mc:AlternateContent xmlns:mc="http://schemas.openxmlformats.org/markup-compatibility/2006" xmlns:p14="http://schemas.microsoft.com/office/powerpoint/2010/main">
+            <mc:Choice Requires="p14">
               <p:contentPart p14:bwMode="auto" r:id="rId89">
                 <p14:nvContentPartPr>
                   <p14:cNvPr id="255" name="Ink 254">
@@ -18433,7 +18445,7 @@
                 </p14:xfrm>
               </p:contentPart>
             </mc:Choice>
-            <mc:Fallback>
+            <mc:Fallback xmlns="">
               <p:pic>
                 <p:nvPicPr>
                   <p:cNvPr id="255" name="Ink 254">
@@ -18464,8 +18476,8 @@
               </p:pic>
             </mc:Fallback>
           </mc:AlternateContent>
-          <mc:AlternateContent xmlns:mc="http://schemas.openxmlformats.org/markup-compatibility/2006">
-            <mc:Choice xmlns:p14="http://schemas.microsoft.com/office/powerpoint/2010/main" Requires="p14">
+          <mc:AlternateContent xmlns:mc="http://schemas.openxmlformats.org/markup-compatibility/2006" xmlns:p14="http://schemas.microsoft.com/office/powerpoint/2010/main">
+            <mc:Choice Requires="p14">
               <p:contentPart p14:bwMode="auto" r:id="rId90">
                 <p14:nvContentPartPr>
                   <p14:cNvPr id="256" name="Ink 255">
@@ -18484,7 +18496,7 @@
                 </p14:xfrm>
               </p:contentPart>
             </mc:Choice>
-            <mc:Fallback>
+            <mc:Fallback xmlns="">
               <p:pic>
                 <p:nvPicPr>
                   <p:cNvPr id="256" name="Ink 255">
@@ -18515,8 +18527,8 @@
               </p:pic>
             </mc:Fallback>
           </mc:AlternateContent>
-          <mc:AlternateContent xmlns:mc="http://schemas.openxmlformats.org/markup-compatibility/2006">
-            <mc:Choice xmlns:p14="http://schemas.microsoft.com/office/powerpoint/2010/main" Requires="p14">
+          <mc:AlternateContent xmlns:mc="http://schemas.openxmlformats.org/markup-compatibility/2006" xmlns:p14="http://schemas.microsoft.com/office/powerpoint/2010/main">
+            <mc:Choice Requires="p14">
               <p:contentPart p14:bwMode="auto" r:id="rId91">
                 <p14:nvContentPartPr>
                   <p14:cNvPr id="257" name="Ink 256">
@@ -18535,7 +18547,7 @@
                 </p14:xfrm>
               </p:contentPart>
             </mc:Choice>
-            <mc:Fallback>
+            <mc:Fallback xmlns="">
               <p:pic>
                 <p:nvPicPr>
                   <p:cNvPr id="257" name="Ink 256">
@@ -18566,8 +18578,8 @@
               </p:pic>
             </mc:Fallback>
           </mc:AlternateContent>
-          <mc:AlternateContent xmlns:mc="http://schemas.openxmlformats.org/markup-compatibility/2006">
-            <mc:Choice xmlns:p14="http://schemas.microsoft.com/office/powerpoint/2010/main" Requires="p14">
+          <mc:AlternateContent xmlns:mc="http://schemas.openxmlformats.org/markup-compatibility/2006" xmlns:p14="http://schemas.microsoft.com/office/powerpoint/2010/main">
+            <mc:Choice Requires="p14">
               <p:contentPart p14:bwMode="auto" r:id="rId92">
                 <p14:nvContentPartPr>
                   <p14:cNvPr id="258" name="Ink 257">
@@ -18586,7 +18598,7 @@
                 </p14:xfrm>
               </p:contentPart>
             </mc:Choice>
-            <mc:Fallback>
+            <mc:Fallback xmlns="">
               <p:pic>
                 <p:nvPicPr>
                   <p:cNvPr id="258" name="Ink 257">
@@ -18617,8 +18629,8 @@
               </p:pic>
             </mc:Fallback>
           </mc:AlternateContent>
-          <mc:AlternateContent xmlns:mc="http://schemas.openxmlformats.org/markup-compatibility/2006">
-            <mc:Choice xmlns:p14="http://schemas.microsoft.com/office/powerpoint/2010/main" Requires="p14">
+          <mc:AlternateContent xmlns:mc="http://schemas.openxmlformats.org/markup-compatibility/2006" xmlns:p14="http://schemas.microsoft.com/office/powerpoint/2010/main">
+            <mc:Choice Requires="p14">
               <p:contentPart p14:bwMode="auto" r:id="rId93">
                 <p14:nvContentPartPr>
                   <p14:cNvPr id="259" name="Ink 258">
@@ -18637,7 +18649,7 @@
                 </p14:xfrm>
               </p:contentPart>
             </mc:Choice>
-            <mc:Fallback>
+            <mc:Fallback xmlns="">
               <p:pic>
                 <p:nvPicPr>
                   <p:cNvPr id="259" name="Ink 258">
@@ -18668,8 +18680,8 @@
               </p:pic>
             </mc:Fallback>
           </mc:AlternateContent>
-          <mc:AlternateContent xmlns:mc="http://schemas.openxmlformats.org/markup-compatibility/2006">
-            <mc:Choice xmlns:p14="http://schemas.microsoft.com/office/powerpoint/2010/main" Requires="p14">
+          <mc:AlternateContent xmlns:mc="http://schemas.openxmlformats.org/markup-compatibility/2006" xmlns:p14="http://schemas.microsoft.com/office/powerpoint/2010/main">
+            <mc:Choice Requires="p14">
               <p:contentPart p14:bwMode="auto" r:id="rId94">
                 <p14:nvContentPartPr>
                   <p14:cNvPr id="260" name="Ink 259">
@@ -18688,7 +18700,7 @@
                 </p14:xfrm>
               </p:contentPart>
             </mc:Choice>
-            <mc:Fallback>
+            <mc:Fallback xmlns="">
               <p:pic>
                 <p:nvPicPr>
                   <p:cNvPr id="260" name="Ink 259">
@@ -18719,8 +18731,8 @@
               </p:pic>
             </mc:Fallback>
           </mc:AlternateContent>
-          <mc:AlternateContent xmlns:mc="http://schemas.openxmlformats.org/markup-compatibility/2006">
-            <mc:Choice xmlns:p14="http://schemas.microsoft.com/office/powerpoint/2010/main" Requires="p14">
+          <mc:AlternateContent xmlns:mc="http://schemas.openxmlformats.org/markup-compatibility/2006" xmlns:p14="http://schemas.microsoft.com/office/powerpoint/2010/main">
+            <mc:Choice Requires="p14">
               <p:contentPart p14:bwMode="auto" r:id="rId95">
                 <p14:nvContentPartPr>
                   <p14:cNvPr id="261" name="Ink 260">
@@ -18739,7 +18751,7 @@
                 </p14:xfrm>
               </p:contentPart>
             </mc:Choice>
-            <mc:Fallback>
+            <mc:Fallback xmlns="">
               <p:pic>
                 <p:nvPicPr>
                   <p:cNvPr id="261" name="Ink 260">
@@ -18770,8 +18782,8 @@
               </p:pic>
             </mc:Fallback>
           </mc:AlternateContent>
-          <mc:AlternateContent xmlns:mc="http://schemas.openxmlformats.org/markup-compatibility/2006">
-            <mc:Choice xmlns:p14="http://schemas.microsoft.com/office/powerpoint/2010/main" Requires="p14">
+          <mc:AlternateContent xmlns:mc="http://schemas.openxmlformats.org/markup-compatibility/2006" xmlns:p14="http://schemas.microsoft.com/office/powerpoint/2010/main">
+            <mc:Choice Requires="p14">
               <p:contentPart p14:bwMode="auto" r:id="rId96">
                 <p14:nvContentPartPr>
                   <p14:cNvPr id="262" name="Ink 261">
@@ -18790,7 +18802,7 @@
                 </p14:xfrm>
               </p:contentPart>
             </mc:Choice>
-            <mc:Fallback>
+            <mc:Fallback xmlns="">
               <p:pic>
                 <p:nvPicPr>
                   <p:cNvPr id="262" name="Ink 261">
@@ -18821,8 +18833,8 @@
               </p:pic>
             </mc:Fallback>
           </mc:AlternateContent>
-          <mc:AlternateContent xmlns:mc="http://schemas.openxmlformats.org/markup-compatibility/2006">
-            <mc:Choice xmlns:p14="http://schemas.microsoft.com/office/powerpoint/2010/main" Requires="p14">
+          <mc:AlternateContent xmlns:mc="http://schemas.openxmlformats.org/markup-compatibility/2006" xmlns:p14="http://schemas.microsoft.com/office/powerpoint/2010/main">
+            <mc:Choice Requires="p14">
               <p:contentPart p14:bwMode="auto" r:id="rId98">
                 <p14:nvContentPartPr>
                   <p14:cNvPr id="263" name="Ink 262">
@@ -18841,7 +18853,7 @@
                 </p14:xfrm>
               </p:contentPart>
             </mc:Choice>
-            <mc:Fallback>
+            <mc:Fallback xmlns="">
               <p:pic>
                 <p:nvPicPr>
                   <p:cNvPr id="263" name="Ink 262">
@@ -18872,8 +18884,8 @@
               </p:pic>
             </mc:Fallback>
           </mc:AlternateContent>
-          <mc:AlternateContent xmlns:mc="http://schemas.openxmlformats.org/markup-compatibility/2006">
-            <mc:Choice xmlns:p14="http://schemas.microsoft.com/office/powerpoint/2010/main" Requires="p14">
+          <mc:AlternateContent xmlns:mc="http://schemas.openxmlformats.org/markup-compatibility/2006" xmlns:p14="http://schemas.microsoft.com/office/powerpoint/2010/main">
+            <mc:Choice Requires="p14">
               <p:contentPart p14:bwMode="auto" r:id="rId99">
                 <p14:nvContentPartPr>
                   <p14:cNvPr id="264" name="Ink 263">
@@ -18892,7 +18904,7 @@
                 </p14:xfrm>
               </p:contentPart>
             </mc:Choice>
-            <mc:Fallback>
+            <mc:Fallback xmlns="">
               <p:pic>
                 <p:nvPicPr>
                   <p:cNvPr id="264" name="Ink 263">
@@ -18923,8 +18935,8 @@
               </p:pic>
             </mc:Fallback>
           </mc:AlternateContent>
-          <mc:AlternateContent xmlns:mc="http://schemas.openxmlformats.org/markup-compatibility/2006">
-            <mc:Choice xmlns:p14="http://schemas.microsoft.com/office/powerpoint/2010/main" Requires="p14">
+          <mc:AlternateContent xmlns:mc="http://schemas.openxmlformats.org/markup-compatibility/2006" xmlns:p14="http://schemas.microsoft.com/office/powerpoint/2010/main">
+            <mc:Choice Requires="p14">
               <p:contentPart p14:bwMode="auto" r:id="rId100">
                 <p14:nvContentPartPr>
                   <p14:cNvPr id="265" name="Ink 264">
@@ -18943,7 +18955,7 @@
                 </p14:xfrm>
               </p:contentPart>
             </mc:Choice>
-            <mc:Fallback>
+            <mc:Fallback xmlns="">
               <p:pic>
                 <p:nvPicPr>
                   <p:cNvPr id="265" name="Ink 264">
@@ -18974,8 +18986,8 @@
               </p:pic>
             </mc:Fallback>
           </mc:AlternateContent>
-          <mc:AlternateContent xmlns:mc="http://schemas.openxmlformats.org/markup-compatibility/2006">
-            <mc:Choice xmlns:p14="http://schemas.microsoft.com/office/powerpoint/2010/main" Requires="p14">
+          <mc:AlternateContent xmlns:mc="http://schemas.openxmlformats.org/markup-compatibility/2006" xmlns:p14="http://schemas.microsoft.com/office/powerpoint/2010/main">
+            <mc:Choice Requires="p14">
               <p:contentPart p14:bwMode="auto" r:id="rId102">
                 <p14:nvContentPartPr>
                   <p14:cNvPr id="266" name="Ink 265">
@@ -18994,7 +19006,7 @@
                 </p14:xfrm>
               </p:contentPart>
             </mc:Choice>
-            <mc:Fallback>
+            <mc:Fallback xmlns="">
               <p:pic>
                 <p:nvPicPr>
                   <p:cNvPr id="266" name="Ink 265">

</xml_diff>

<commit_message>
moving forward, we are only focusing on temperature models. I'm changing terminology over to gain/loss, and running temp models one more time.
</commit_message>
<xml_diff>
--- a/figures/Figure1/figure1_finalforpdf.pptx
+++ b/figures/Figure1/figure1_finalforpdf.pptx
@@ -1979,7 +1979,7 @@
           <a:p>
             <a:fld id="{61A7976E-9F0E-DF46-BEE6-B263DADB2CCE}" type="datetimeFigureOut">
               <a:rPr lang="en-US" smtClean="0"/>
-              <a:t>8/26/22</a:t>
+              <a:t>9/11/22</a:t>
             </a:fld>
             <a:endParaRPr lang="en-US"/>
           </a:p>
@@ -2656,7 +2656,7 @@
           <a:p>
             <a:fld id="{5858EA79-B7C1-E245-85A8-5D7A58E35F5C}" type="datetimeFigureOut">
               <a:rPr lang="en-US" smtClean="0"/>
-              <a:t>8/26/22</a:t>
+              <a:t>9/11/22</a:t>
             </a:fld>
             <a:endParaRPr lang="en-US"/>
           </a:p>
@@ -2826,7 +2826,7 @@
           <a:p>
             <a:fld id="{5858EA79-B7C1-E245-85A8-5D7A58E35F5C}" type="datetimeFigureOut">
               <a:rPr lang="en-US" smtClean="0"/>
-              <a:t>8/26/22</a:t>
+              <a:t>9/11/22</a:t>
             </a:fld>
             <a:endParaRPr lang="en-US"/>
           </a:p>
@@ -3006,7 +3006,7 @@
           <a:p>
             <a:fld id="{5858EA79-B7C1-E245-85A8-5D7A58E35F5C}" type="datetimeFigureOut">
               <a:rPr lang="en-US" smtClean="0"/>
-              <a:t>8/26/22</a:t>
+              <a:t>9/11/22</a:t>
             </a:fld>
             <a:endParaRPr lang="en-US"/>
           </a:p>
@@ -3176,7 +3176,7 @@
           <a:p>
             <a:fld id="{5858EA79-B7C1-E245-85A8-5D7A58E35F5C}" type="datetimeFigureOut">
               <a:rPr lang="en-US" smtClean="0"/>
-              <a:t>8/26/22</a:t>
+              <a:t>9/11/22</a:t>
             </a:fld>
             <a:endParaRPr lang="en-US"/>
           </a:p>
@@ -3420,7 +3420,7 @@
           <a:p>
             <a:fld id="{5858EA79-B7C1-E245-85A8-5D7A58E35F5C}" type="datetimeFigureOut">
               <a:rPr lang="en-US" smtClean="0"/>
-              <a:t>8/26/22</a:t>
+              <a:t>9/11/22</a:t>
             </a:fld>
             <a:endParaRPr lang="en-US"/>
           </a:p>
@@ -3652,7 +3652,7 @@
           <a:p>
             <a:fld id="{5858EA79-B7C1-E245-85A8-5D7A58E35F5C}" type="datetimeFigureOut">
               <a:rPr lang="en-US" smtClean="0"/>
-              <a:t>8/26/22</a:t>
+              <a:t>9/11/22</a:t>
             </a:fld>
             <a:endParaRPr lang="en-US"/>
           </a:p>
@@ -4019,7 +4019,7 @@
           <a:p>
             <a:fld id="{5858EA79-B7C1-E245-85A8-5D7A58E35F5C}" type="datetimeFigureOut">
               <a:rPr lang="en-US" smtClean="0"/>
-              <a:t>8/26/22</a:t>
+              <a:t>9/11/22</a:t>
             </a:fld>
             <a:endParaRPr lang="en-US"/>
           </a:p>
@@ -4137,7 +4137,7 @@
           <a:p>
             <a:fld id="{5858EA79-B7C1-E245-85A8-5D7A58E35F5C}" type="datetimeFigureOut">
               <a:rPr lang="en-US" smtClean="0"/>
-              <a:t>8/26/22</a:t>
+              <a:t>9/11/22</a:t>
             </a:fld>
             <a:endParaRPr lang="en-US"/>
           </a:p>
@@ -4232,7 +4232,7 @@
           <a:p>
             <a:fld id="{5858EA79-B7C1-E245-85A8-5D7A58E35F5C}" type="datetimeFigureOut">
               <a:rPr lang="en-US" smtClean="0"/>
-              <a:t>8/26/22</a:t>
+              <a:t>9/11/22</a:t>
             </a:fld>
             <a:endParaRPr lang="en-US"/>
           </a:p>
@@ -4509,7 +4509,7 @@
           <a:p>
             <a:fld id="{5858EA79-B7C1-E245-85A8-5D7A58E35F5C}" type="datetimeFigureOut">
               <a:rPr lang="en-US" smtClean="0"/>
-              <a:t>8/26/22</a:t>
+              <a:t>9/11/22</a:t>
             </a:fld>
             <a:endParaRPr lang="en-US"/>
           </a:p>
@@ -4766,7 +4766,7 @@
           <a:p>
             <a:fld id="{5858EA79-B7C1-E245-85A8-5D7A58E35F5C}" type="datetimeFigureOut">
               <a:rPr lang="en-US" smtClean="0"/>
-              <a:t>8/26/22</a:t>
+              <a:t>9/11/22</a:t>
             </a:fld>
             <a:endParaRPr lang="en-US"/>
           </a:p>
@@ -4979,7 +4979,7 @@
           <a:p>
             <a:fld id="{5858EA79-B7C1-E245-85A8-5D7A58E35F5C}" type="datetimeFigureOut">
               <a:rPr lang="en-US" smtClean="0"/>
-              <a:t>8/26/22</a:t>
+              <a:t>9/11/22</a:t>
             </a:fld>
             <a:endParaRPr lang="en-US"/>
           </a:p>
@@ -12031,16 +12031,23 @@
               <a:rPr lang="en-US" sz="700" dirty="0">
                 <a:latin typeface="Helvetica" pitchFamily="2" charset="0"/>
               </a:rPr>
-              <a:t>Larger population sizes,</a:t>
+              <a:t>Lower mortality</a:t>
             </a:r>
-          </a:p>
-          <a:p>
             <a:r>
               <a:rPr lang="en-US" sz="700" dirty="0">
                 <a:latin typeface="Helvetica" pitchFamily="2" charset="0"/>
                 <a:sym typeface="Wingdings" pitchFamily="2" charset="2"/>
               </a:rPr>
-              <a:t>Slower population dynamics,</a:t>
+              <a:t>,</a:t>
+            </a:r>
+          </a:p>
+          <a:p>
+            <a:r>
+              <a:rPr lang="en-US" sz="700" dirty="0">
+                <a:latin typeface="Helvetica" pitchFamily="2" charset="0"/>
+                <a:sym typeface="Wingdings" pitchFamily="2" charset="2"/>
+              </a:rPr>
+              <a:t>Longer lifespans,</a:t>
             </a:r>
           </a:p>
           <a:p>
@@ -12093,7 +12100,7 @@
               <a:rPr lang="en-US" sz="700" dirty="0">
                 <a:latin typeface="Helvetica" pitchFamily="2" charset="0"/>
               </a:rPr>
-              <a:t>Smaller population sizes,</a:t>
+              <a:t>Higher mortality,</a:t>
             </a:r>
           </a:p>
           <a:p>
@@ -12101,7 +12108,7 @@
               <a:rPr lang="en-US" sz="700" dirty="0">
                 <a:latin typeface="Helvetica" pitchFamily="2" charset="0"/>
               </a:rPr>
-              <a:t>Faster population dynamics,</a:t>
+              <a:t>Shorter lifespans,</a:t>
             </a:r>
           </a:p>
           <a:p>

</xml_diff>